<commit_message>
worked on simple_calc.py and imported project proposal
</commit_message>
<xml_diff>
--- a/project_01/docs/Briano_EDES301_project_01_proposal.pptx
+++ b/project_01/docs/Briano_EDES301_project_01_proposal.pptx
@@ -1734,7 +1734,7 @@
   <p:cSld>
     <p:spTree>
       <p:nvGrpSpPr>
-        <p:cNvPr id="425" name="Shape 425"/>
+        <p:cNvPr id="431" name="Shape 431"/>
         <p:cNvGrpSpPr/>
         <p:nvPr/>
       </p:nvGrpSpPr>
@@ -1748,7 +1748,7 @@
       </p:grpSpPr>
       <p:sp>
         <p:nvSpPr>
-          <p:cNvPr id="426" name="Google Shape;426;p4:notes"/>
+          <p:cNvPr id="432" name="Google Shape;432;p4:notes"/>
           <p:cNvSpPr txBox="1"/>
           <p:nvPr>
             <p:ph idx="1" type="body"/>
@@ -1787,7 +1787,7 @@
       </p:sp>
       <p:sp>
         <p:nvSpPr>
-          <p:cNvPr id="427" name="Google Shape;427;p4:notes"/>
+          <p:cNvPr id="433" name="Google Shape;433;p4:notes"/>
           <p:cNvSpPr/>
           <p:nvPr>
             <p:ph idx="2" type="sldImg"/>
@@ -1833,7 +1833,7 @@
   <p:cSld>
     <p:spTree>
       <p:nvGrpSpPr>
-        <p:cNvPr id="455" name="Shape 455"/>
+        <p:cNvPr id="467" name="Shape 467"/>
         <p:cNvGrpSpPr/>
         <p:nvPr/>
       </p:nvGrpSpPr>
@@ -1847,7 +1847,7 @@
       </p:grpSpPr>
       <p:sp>
         <p:nvSpPr>
-          <p:cNvPr id="456" name="Google Shape;456;p5:notes"/>
+          <p:cNvPr id="468" name="Google Shape;468;p5:notes"/>
           <p:cNvSpPr txBox="1"/>
           <p:nvPr>
             <p:ph idx="1" type="body"/>
@@ -1878,6 +1878,89 @@
               <a:buNone/>
             </a:pPr>
             <a:r>
+              <a:rPr lang="en-US"/>
+              <a:t>Need DC motors for flywheel mechanism. Continuous rotation servo for feeding mechanism. </a:t>
+            </a:r>
+            <a:endParaRPr/>
+          </a:p>
+          <a:p>
+            <a:pPr indent="0" lvl="0" marL="0" rtl="0" algn="l">
+              <a:spcBef>
+                <a:spcPts val="0"/>
+              </a:spcBef>
+              <a:spcAft>
+                <a:spcPts val="0"/>
+              </a:spcAft>
+              <a:buNone/>
+            </a:pPr>
+            <a:r>
+              <a:t/>
+            </a:r>
+            <a:endParaRPr/>
+          </a:p>
+          <a:p>
+            <a:pPr indent="0" lvl="0" marL="0" rtl="0" algn="l">
+              <a:spcBef>
+                <a:spcPts val="0"/>
+              </a:spcBef>
+              <a:spcAft>
+                <a:spcPts val="0"/>
+              </a:spcAft>
+              <a:buNone/>
+            </a:pPr>
+            <a:r>
+              <a:rPr lang="en-US"/>
+              <a:t>How do I know when the treats are empty? How will I alert the user?</a:t>
+            </a:r>
+            <a:endParaRPr/>
+          </a:p>
+          <a:p>
+            <a:pPr indent="0" lvl="0" marL="0" rtl="0" algn="l">
+              <a:spcBef>
+                <a:spcPts val="0"/>
+              </a:spcBef>
+              <a:spcAft>
+                <a:spcPts val="0"/>
+              </a:spcAft>
+              <a:buNone/>
+            </a:pPr>
+            <a:r>
+              <a:rPr lang="en-US"/>
+              <a:t>When do I </a:t>
+            </a:r>
+            <a:r>
+              <a:rPr lang="en-US"/>
+              <a:t>stop dispensing treats?</a:t>
+            </a:r>
+            <a:endParaRPr/>
+          </a:p>
+          <a:p>
+            <a:pPr indent="0" lvl="0" marL="0" rtl="0" algn="l">
+              <a:spcBef>
+                <a:spcPts val="0"/>
+              </a:spcBef>
+              <a:spcAft>
+                <a:spcPts val="0"/>
+              </a:spcAft>
+              <a:buNone/>
+            </a:pPr>
+            <a:r>
+              <a:rPr lang="en-US"/>
+              <a:t>Finalize BOM</a:t>
+            </a:r>
+            <a:endParaRPr/>
+          </a:p>
+          <a:p>
+            <a:pPr indent="0" lvl="0" marL="0" rtl="0" algn="l">
+              <a:spcBef>
+                <a:spcPts val="0"/>
+              </a:spcBef>
+              <a:spcAft>
+                <a:spcPts val="0"/>
+              </a:spcAft>
+              <a:buNone/>
+            </a:pPr>
+            <a:r>
               <a:t/>
             </a:r>
             <a:endParaRPr/>
@@ -1886,7 +1969,7 @@
       </p:sp>
       <p:sp>
         <p:nvSpPr>
-          <p:cNvPr id="457" name="Google Shape;457;p5:notes"/>
+          <p:cNvPr id="469" name="Google Shape;469;p5:notes"/>
           <p:cNvSpPr/>
           <p:nvPr>
             <p:ph idx="2" type="sldImg"/>
@@ -19523,10 +19606,14 @@
               </a:rPr>
               <a:t>Adafruit</a:t>
             </a:r>
+            <a:r>
+              <a:rPr lang="en-US"/>
+              <a:t>, </a:t>
+            </a:r>
             <a:endParaRPr/>
           </a:p>
           <a:p>
-            <a:pPr indent="-182880" lvl="1" marL="457200" rtl="0" algn="l">
+            <a:pPr indent="0" lvl="0" marL="457200" rtl="0" algn="l">
               <a:lnSpc>
                 <a:spcPct val="90000"/>
               </a:lnSpc>
@@ -19536,8 +19623,7 @@
               <a:spcAft>
                 <a:spcPts val="0"/>
               </a:spcAft>
-              <a:buSzPts val="1800"/>
-              <a:buChar char="▪"/>
+              <a:buNone/>
             </a:pPr>
             <a:r>
               <a:t/>
@@ -19567,7 +19653,7 @@
             </a:r>
             <a:r>
               <a:rPr lang="en-US"/>
-              <a:t> a treat? Do they want something more stimulating? Well I’ve got them covered! I’m going to make a treat dispenser box with a flywheel launcher and treat feeder mechanism lying on top. In front of the box there will be a large blue button and a large yellow button with a same colored LED above, embedded into the wall of the box. When the test subject barks at the box, a random LED will light up, and the test subject is required to press the corresponding button in 15 seconds to launch a treat (which they can then chase after). The box will need to be barked at again to restart the process. </a:t>
+              <a:t> a treat? Do they want something more stimulating? Well I’ve got them covered! I’m going to make a treat dispenser box with a flywheel launcher and treat feeder mechanism lying on top. In front of the box there will be a large blue button and a large yellow button with a same colored LED above, embedded into the wall of the box. When the test subject barks at the box, a random LED will light up, and the test subject is required to press the corresponding button in 15 seconds to launch a treat (which they can then chase after). The box will need to be barked at again to restart the process. The Dispenser will use an IR sensor to detect if the feeding tube is out of treats, and then send you an email requesting to be refilled!</a:t>
             </a:r>
             <a:endParaRPr/>
           </a:p>
@@ -19731,7 +19817,7 @@
         <p:spPr>
           <a:xfrm>
             <a:off x="6178700" y="1501350"/>
-            <a:ext cx="3732900" cy="3855300"/>
+            <a:ext cx="3732900" cy="4362300"/>
           </a:xfrm>
           <a:prstGeom prst="rect">
             <a:avLst/>
@@ -19855,7 +19941,7 @@
         </p:nvCxnSpPr>
         <p:spPr>
           <a:xfrm rot="10800000">
-            <a:off x="1168200" y="2044825"/>
+            <a:off x="3237250" y="1956250"/>
             <a:ext cx="993300" cy="0"/>
           </a:xfrm>
           <a:prstGeom prst="straightConnector1">
@@ -19881,7 +19967,7 @@
         </p:nvCxnSpPr>
         <p:spPr>
           <a:xfrm rot="10800000">
-            <a:off x="5196850" y="3162325"/>
+            <a:off x="5201375" y="2572300"/>
             <a:ext cx="993300" cy="0"/>
           </a:xfrm>
           <a:prstGeom prst="straightConnector1">
@@ -19907,7 +19993,7 @@
         </p:nvCxnSpPr>
         <p:spPr>
           <a:xfrm rot="10800000">
-            <a:off x="5196850" y="3954250"/>
+            <a:off x="5201375" y="3162325"/>
             <a:ext cx="993300" cy="0"/>
           </a:xfrm>
           <a:prstGeom prst="straightConnector1">
@@ -19933,8 +20019,8 @@
         </p:nvSpPr>
         <p:spPr>
           <a:xfrm>
-            <a:off x="6190150" y="1705650"/>
-            <a:ext cx="993300" cy="327600"/>
+            <a:off x="6178550" y="1796413"/>
+            <a:ext cx="993300" cy="462600"/>
           </a:xfrm>
           <a:prstGeom prst="rect">
             <a:avLst/>
@@ -19965,31 +20051,7 @@
                   <a:schemeClr val="dk1"/>
                 </a:solidFill>
               </a:rPr>
-              <a:t>PWM/GPIO</a:t>
-            </a:r>
-            <a:endParaRPr sz="1100">
-              <a:solidFill>
-                <a:schemeClr val="dk1"/>
-              </a:solidFill>
-            </a:endParaRPr>
-          </a:p>
-          <a:p>
-            <a:pPr indent="0" lvl="0" marL="0" rtl="0" algn="l">
-              <a:spcBef>
-                <a:spcPts val="0"/>
-              </a:spcBef>
-              <a:spcAft>
-                <a:spcPts val="0"/>
-              </a:spcAft>
-              <a:buNone/>
-            </a:pPr>
-            <a:r>
-              <a:rPr lang="en-US" sz="1100">
-                <a:solidFill>
-                  <a:schemeClr val="dk1"/>
-                </a:solidFill>
-              </a:rPr>
-              <a:t>P2_1</a:t>
+              <a:t>GPIO x2</a:t>
             </a:r>
             <a:endParaRPr sz="1100">
               <a:solidFill>
@@ -20007,8 +20069,8 @@
         </p:nvSpPr>
         <p:spPr>
           <a:xfrm>
-            <a:off x="4055800" y="1689925"/>
-            <a:ext cx="1141200" cy="462600"/>
+            <a:off x="4251850" y="1668225"/>
+            <a:ext cx="945000" cy="528000"/>
           </a:xfrm>
           <a:prstGeom prst="rect">
             <a:avLst/>
@@ -20042,10 +20104,10 @@
               <a:buNone/>
             </a:pPr>
             <a:r>
-              <a:rPr lang="en-US"/>
-              <a:t>Logic Shifter</a:t>
+              <a:rPr lang="en-US" sz="1200"/>
+              <a:t>Motor Shield</a:t>
             </a:r>
-            <a:endParaRPr/>
+            <a:endParaRPr sz="1200"/>
           </a:p>
         </p:txBody>
       </p:sp>
@@ -20057,7 +20119,7 @@
         </p:nvCxnSpPr>
         <p:spPr>
           <a:xfrm rot="10800000">
-            <a:off x="3062500" y="1945650"/>
+            <a:off x="5201375" y="4983100"/>
             <a:ext cx="993300" cy="0"/>
           </a:xfrm>
           <a:prstGeom prst="straightConnector1">
@@ -20083,7 +20145,7 @@
         </p:nvSpPr>
         <p:spPr>
           <a:xfrm>
-            <a:off x="2182800" y="1680600"/>
+            <a:off x="2325150" y="1668225"/>
             <a:ext cx="945000" cy="528000"/>
           </a:xfrm>
           <a:prstGeom prst="rect">
@@ -20119,7 +20181,311 @@
             </a:pPr>
             <a:r>
               <a:rPr lang="en-US" sz="1200"/>
-              <a:t>Motor Shield</a:t>
+              <a:t>DC Motor</a:t>
+            </a:r>
+            <a:endParaRPr sz="1200"/>
+          </a:p>
+        </p:txBody>
+      </p:sp>
+      <p:sp>
+        <p:nvSpPr>
+          <p:cNvPr id="416" name="Google Shape;416;p15"/>
+          <p:cNvSpPr/>
+          <p:nvPr/>
+        </p:nvSpPr>
+        <p:spPr>
+          <a:xfrm>
+            <a:off x="4251850" y="5351725"/>
+            <a:ext cx="945000" cy="528000"/>
+          </a:xfrm>
+          <a:prstGeom prst="rect">
+            <a:avLst/>
+          </a:prstGeom>
+          <a:solidFill>
+            <a:schemeClr val="lt2"/>
+          </a:solidFill>
+          <a:ln cap="flat" cmpd="sng" w="9525">
+            <a:solidFill>
+              <a:schemeClr val="dk2"/>
+            </a:solidFill>
+            <a:prstDash val="solid"/>
+            <a:round/>
+            <a:headEnd len="sm" w="sm" type="none"/>
+            <a:tailEnd len="sm" w="sm" type="none"/>
+          </a:ln>
+        </p:spPr>
+        <p:txBody>
+          <a:bodyPr anchorCtr="0" anchor="ctr" bIns="91425" lIns="91425" spcFirstLastPara="1" rIns="91425" wrap="square" tIns="91425">
+            <a:noAutofit/>
+          </a:bodyPr>
+          <a:lstStyle/>
+          <a:p>
+            <a:pPr indent="0" lvl="0" marL="0" rtl="0" algn="ctr">
+              <a:spcBef>
+                <a:spcPts val="0"/>
+              </a:spcBef>
+              <a:spcAft>
+                <a:spcPts val="0"/>
+              </a:spcAft>
+              <a:buNone/>
+            </a:pPr>
+            <a:r>
+              <a:rPr lang="en-US" sz="1200"/>
+              <a:t>Buttons</a:t>
+            </a:r>
+            <a:r>
+              <a:rPr lang="en-US" sz="1200"/>
+              <a:t> x2</a:t>
+            </a:r>
+            <a:endParaRPr sz="1200"/>
+          </a:p>
+        </p:txBody>
+      </p:sp>
+      <p:sp>
+        <p:nvSpPr>
+          <p:cNvPr id="417" name="Google Shape;417;p15"/>
+          <p:cNvSpPr/>
+          <p:nvPr/>
+        </p:nvSpPr>
+        <p:spPr>
+          <a:xfrm>
+            <a:off x="4251850" y="2284625"/>
+            <a:ext cx="945000" cy="528000"/>
+          </a:xfrm>
+          <a:prstGeom prst="rect">
+            <a:avLst/>
+          </a:prstGeom>
+          <a:solidFill>
+            <a:schemeClr val="lt2"/>
+          </a:solidFill>
+          <a:ln cap="flat" cmpd="sng" w="9525">
+            <a:solidFill>
+              <a:schemeClr val="dk2"/>
+            </a:solidFill>
+            <a:prstDash val="solid"/>
+            <a:round/>
+            <a:headEnd len="sm" w="sm" type="none"/>
+            <a:tailEnd len="sm" w="sm" type="none"/>
+          </a:ln>
+        </p:spPr>
+        <p:txBody>
+          <a:bodyPr anchorCtr="0" anchor="ctr" bIns="91425" lIns="91425" spcFirstLastPara="1" rIns="91425" wrap="square" tIns="91425">
+            <a:noAutofit/>
+          </a:bodyPr>
+          <a:lstStyle/>
+          <a:p>
+            <a:pPr indent="0" lvl="0" marL="0" rtl="0" algn="ctr">
+              <a:spcBef>
+                <a:spcPts val="0"/>
+              </a:spcBef>
+              <a:spcAft>
+                <a:spcPts val="0"/>
+              </a:spcAft>
+              <a:buNone/>
+            </a:pPr>
+            <a:r>
+              <a:rPr lang="en-US" sz="1200"/>
+              <a:t>CRM</a:t>
+            </a:r>
+            <a:endParaRPr sz="1200"/>
+          </a:p>
+        </p:txBody>
+      </p:sp>
+      <p:sp>
+        <p:nvSpPr>
+          <p:cNvPr id="418" name="Google Shape;418;p15"/>
+          <p:cNvSpPr/>
+          <p:nvPr/>
+        </p:nvSpPr>
+        <p:spPr>
+          <a:xfrm>
+            <a:off x="4251850" y="2901025"/>
+            <a:ext cx="945000" cy="528000"/>
+          </a:xfrm>
+          <a:prstGeom prst="rect">
+            <a:avLst/>
+          </a:prstGeom>
+          <a:solidFill>
+            <a:schemeClr val="lt2"/>
+          </a:solidFill>
+          <a:ln cap="flat" cmpd="sng" w="9525">
+            <a:solidFill>
+              <a:schemeClr val="dk2"/>
+            </a:solidFill>
+            <a:prstDash val="solid"/>
+            <a:round/>
+            <a:headEnd len="sm" w="sm" type="none"/>
+            <a:tailEnd len="sm" w="sm" type="none"/>
+          </a:ln>
+        </p:spPr>
+        <p:txBody>
+          <a:bodyPr anchorCtr="0" anchor="ctr" bIns="91425" lIns="91425" spcFirstLastPara="1" rIns="91425" wrap="square" tIns="91425">
+            <a:noAutofit/>
+          </a:bodyPr>
+          <a:lstStyle/>
+          <a:p>
+            <a:pPr indent="0" lvl="0" marL="0" rtl="0" algn="ctr">
+              <a:spcBef>
+                <a:spcPts val="0"/>
+              </a:spcBef>
+              <a:spcAft>
+                <a:spcPts val="0"/>
+              </a:spcAft>
+              <a:buNone/>
+            </a:pPr>
+            <a:r>
+              <a:rPr lang="en-US" sz="1200"/>
+              <a:t>Mic</a:t>
+            </a:r>
+            <a:endParaRPr sz="1200"/>
+          </a:p>
+        </p:txBody>
+      </p:sp>
+      <p:sp>
+        <p:nvSpPr>
+          <p:cNvPr id="419" name="Google Shape;419;p15"/>
+          <p:cNvSpPr/>
+          <p:nvPr/>
+        </p:nvSpPr>
+        <p:spPr>
+          <a:xfrm>
+            <a:off x="4251850" y="3513700"/>
+            <a:ext cx="945000" cy="528000"/>
+          </a:xfrm>
+          <a:prstGeom prst="rect">
+            <a:avLst/>
+          </a:prstGeom>
+          <a:solidFill>
+            <a:schemeClr val="lt2"/>
+          </a:solidFill>
+          <a:ln cap="flat" cmpd="sng" w="9525">
+            <a:solidFill>
+              <a:schemeClr val="dk2"/>
+            </a:solidFill>
+            <a:prstDash val="solid"/>
+            <a:round/>
+            <a:headEnd len="sm" w="sm" type="none"/>
+            <a:tailEnd len="sm" w="sm" type="none"/>
+          </a:ln>
+        </p:spPr>
+        <p:txBody>
+          <a:bodyPr anchorCtr="0" anchor="ctr" bIns="91425" lIns="91425" spcFirstLastPara="1" rIns="91425" wrap="square" tIns="91425">
+            <a:noAutofit/>
+          </a:bodyPr>
+          <a:lstStyle/>
+          <a:p>
+            <a:pPr indent="0" lvl="0" marL="0" rtl="0" algn="ctr">
+              <a:spcBef>
+                <a:spcPts val="0"/>
+              </a:spcBef>
+              <a:spcAft>
+                <a:spcPts val="0"/>
+              </a:spcAft>
+              <a:buNone/>
+            </a:pPr>
+            <a:r>
+              <a:rPr lang="en-US" sz="1200"/>
+              <a:t>IR Sensor</a:t>
+            </a:r>
+            <a:endParaRPr sz="1200"/>
+          </a:p>
+        </p:txBody>
+      </p:sp>
+      <p:sp>
+        <p:nvSpPr>
+          <p:cNvPr id="420" name="Google Shape;420;p15"/>
+          <p:cNvSpPr/>
+          <p:nvPr/>
+        </p:nvSpPr>
+        <p:spPr>
+          <a:xfrm>
+            <a:off x="4251850" y="4126375"/>
+            <a:ext cx="945000" cy="528000"/>
+          </a:xfrm>
+          <a:prstGeom prst="rect">
+            <a:avLst/>
+          </a:prstGeom>
+          <a:solidFill>
+            <a:schemeClr val="lt2"/>
+          </a:solidFill>
+          <a:ln cap="flat" cmpd="sng" w="9525">
+            <a:solidFill>
+              <a:schemeClr val="dk2"/>
+            </a:solidFill>
+            <a:prstDash val="solid"/>
+            <a:round/>
+            <a:headEnd len="sm" w="sm" type="none"/>
+            <a:tailEnd len="sm" w="sm" type="none"/>
+          </a:ln>
+        </p:spPr>
+        <p:txBody>
+          <a:bodyPr anchorCtr="0" anchor="ctr" bIns="91425" lIns="91425" spcFirstLastPara="1" rIns="91425" wrap="square" tIns="91425">
+            <a:noAutofit/>
+          </a:bodyPr>
+          <a:lstStyle/>
+          <a:p>
+            <a:pPr indent="0" lvl="0" marL="0" rtl="0" algn="ctr">
+              <a:spcBef>
+                <a:spcPts val="0"/>
+              </a:spcBef>
+              <a:spcAft>
+                <a:spcPts val="0"/>
+              </a:spcAft>
+              <a:buNone/>
+            </a:pPr>
+            <a:r>
+              <a:rPr lang="en-US" sz="1200"/>
+              <a:t>Buzzer</a:t>
+            </a:r>
+            <a:endParaRPr sz="1200"/>
+          </a:p>
+        </p:txBody>
+      </p:sp>
+      <p:sp>
+        <p:nvSpPr>
+          <p:cNvPr id="421" name="Google Shape;421;p15"/>
+          <p:cNvSpPr/>
+          <p:nvPr/>
+        </p:nvSpPr>
+        <p:spPr>
+          <a:xfrm>
+            <a:off x="4251850" y="4739050"/>
+            <a:ext cx="945000" cy="528000"/>
+          </a:xfrm>
+          <a:prstGeom prst="rect">
+            <a:avLst/>
+          </a:prstGeom>
+          <a:solidFill>
+            <a:schemeClr val="lt2"/>
+          </a:solidFill>
+          <a:ln cap="flat" cmpd="sng" w="9525">
+            <a:solidFill>
+              <a:schemeClr val="dk2"/>
+            </a:solidFill>
+            <a:prstDash val="solid"/>
+            <a:round/>
+            <a:headEnd len="sm" w="sm" type="none"/>
+            <a:tailEnd len="sm" w="sm" type="none"/>
+          </a:ln>
+        </p:spPr>
+        <p:txBody>
+          <a:bodyPr anchorCtr="0" anchor="ctr" bIns="91425" lIns="91425" spcFirstLastPara="1" rIns="91425" wrap="square" tIns="91425">
+            <a:noAutofit/>
+          </a:bodyPr>
+          <a:lstStyle/>
+          <a:p>
+            <a:pPr indent="0" lvl="0" marL="0" rtl="0" algn="ctr">
+              <a:spcBef>
+                <a:spcPts val="0"/>
+              </a:spcBef>
+              <a:spcAft>
+                <a:spcPts val="0"/>
+              </a:spcAft>
+              <a:buNone/>
+            </a:pPr>
+            <a:r>
+              <a:rPr lang="en-US" sz="1200"/>
+              <a:t>LEDS x2</a:t>
             </a:r>
             <a:endParaRPr sz="1200"/>
           </a:p>
@@ -20127,13 +20493,65 @@
       </p:sp>
       <p:cxnSp>
         <p:nvCxnSpPr>
-          <p:cNvPr id="416" name="Google Shape;416;p15"/>
+          <p:cNvPr id="422" name="Google Shape;422;p15"/>
           <p:cNvCxnSpPr/>
           <p:nvPr/>
         </p:nvCxnSpPr>
         <p:spPr>
           <a:xfrm rot="10800000">
-            <a:off x="1168200" y="1869450"/>
+            <a:off x="5201375" y="5615725"/>
+            <a:ext cx="993300" cy="0"/>
+          </a:xfrm>
+          <a:prstGeom prst="straightConnector1">
+            <a:avLst/>
+          </a:prstGeom>
+          <a:noFill/>
+          <a:ln cap="flat" cmpd="sng" w="9525">
+            <a:solidFill>
+              <a:schemeClr val="dk2"/>
+            </a:solidFill>
+            <a:prstDash val="solid"/>
+            <a:round/>
+            <a:headEnd len="med" w="med" type="none"/>
+            <a:tailEnd len="med" w="med" type="none"/>
+          </a:ln>
+        </p:spPr>
+      </p:cxnSp>
+      <p:cxnSp>
+        <p:nvCxnSpPr>
+          <p:cNvPr id="423" name="Google Shape;423;p15"/>
+          <p:cNvCxnSpPr/>
+          <p:nvPr/>
+        </p:nvCxnSpPr>
+        <p:spPr>
+          <a:xfrm rot="10800000">
+            <a:off x="5201375" y="4390375"/>
+            <a:ext cx="993300" cy="0"/>
+          </a:xfrm>
+          <a:prstGeom prst="straightConnector1">
+            <a:avLst/>
+          </a:prstGeom>
+          <a:noFill/>
+          <a:ln cap="flat" cmpd="sng" w="9525">
+            <a:solidFill>
+              <a:schemeClr val="dk2"/>
+            </a:solidFill>
+            <a:prstDash val="solid"/>
+            <a:round/>
+            <a:headEnd len="med" w="med" type="none"/>
+            <a:tailEnd len="med" w="med" type="none"/>
+          </a:ln>
+        </p:spPr>
+      </p:cxnSp>
+      <p:cxnSp>
+        <p:nvCxnSpPr>
+          <p:cNvPr id="424" name="Google Shape;424;p15"/>
+          <p:cNvCxnSpPr/>
+          <p:nvPr/>
+        </p:nvCxnSpPr>
+        <p:spPr>
+          <a:xfrm rot="10800000">
+            <a:off x="5201375" y="3797650"/>
             <a:ext cx="993300" cy="0"/>
           </a:xfrm>
           <a:prstGeom prst="straightConnector1">
@@ -20153,14 +20571,14 @@
       </p:cxnSp>
       <p:sp>
         <p:nvSpPr>
-          <p:cNvPr id="417" name="Google Shape;417;p15"/>
+          <p:cNvPr id="425" name="Google Shape;425;p15"/>
           <p:cNvSpPr txBox="1"/>
           <p:nvPr/>
         </p:nvSpPr>
         <p:spPr>
           <a:xfrm>
-            <a:off x="586700" y="1705650"/>
-            <a:ext cx="614400" cy="327600"/>
+            <a:off x="6199200" y="2350013"/>
+            <a:ext cx="993300" cy="462600"/>
           </a:xfrm>
           <a:prstGeom prst="rect">
             <a:avLst/>
@@ -20191,9 +20609,9 @@
                   <a:schemeClr val="dk1"/>
                 </a:solidFill>
               </a:rPr>
-              <a:t>DC Motors</a:t>
+              <a:t>PWM</a:t>
             </a:r>
-            <a:endParaRPr sz="400">
+            <a:endParaRPr sz="1100">
               <a:solidFill>
                 <a:schemeClr val="dk1"/>
               </a:solidFill>
@@ -20203,14 +20621,14 @@
       </p:sp>
       <p:sp>
         <p:nvSpPr>
-          <p:cNvPr id="418" name="Google Shape;418;p15"/>
+          <p:cNvPr id="426" name="Google Shape;426;p15"/>
           <p:cNvSpPr txBox="1"/>
           <p:nvPr/>
         </p:nvSpPr>
         <p:spPr>
           <a:xfrm>
-            <a:off x="4251850" y="2884900"/>
-            <a:ext cx="945000" cy="225300"/>
+            <a:off x="6199200" y="4191763"/>
+            <a:ext cx="993300" cy="462600"/>
           </a:xfrm>
           <a:prstGeom prst="rect">
             <a:avLst/>
@@ -20236,14 +20654,14 @@
               <a:buNone/>
             </a:pPr>
             <a:r>
-              <a:rPr lang="en-US" sz="1300">
+              <a:rPr lang="en-US" sz="1100">
                 <a:solidFill>
                   <a:schemeClr val="dk1"/>
                 </a:solidFill>
               </a:rPr>
-              <a:t>Yellow Button</a:t>
+              <a:t>PWM</a:t>
             </a:r>
-            <a:endParaRPr sz="1300">
+            <a:endParaRPr sz="1100">
               <a:solidFill>
                 <a:schemeClr val="dk1"/>
               </a:solidFill>
@@ -20253,14 +20671,14 @@
       </p:sp>
       <p:sp>
         <p:nvSpPr>
-          <p:cNvPr id="419" name="Google Shape;419;p15"/>
+          <p:cNvPr id="427" name="Google Shape;427;p15"/>
           <p:cNvSpPr txBox="1"/>
           <p:nvPr/>
         </p:nvSpPr>
         <p:spPr>
           <a:xfrm>
-            <a:off x="4300150" y="3728950"/>
-            <a:ext cx="945000" cy="225300"/>
+            <a:off x="6178550" y="3666550"/>
+            <a:ext cx="993300" cy="462600"/>
           </a:xfrm>
           <a:prstGeom prst="rect">
             <a:avLst/>
@@ -20286,14 +20704,14 @@
               <a:buNone/>
             </a:pPr>
             <a:r>
-              <a:rPr lang="en-US" sz="1300">
+              <a:rPr lang="en-US" sz="1100">
                 <a:solidFill>
                   <a:schemeClr val="dk1"/>
                 </a:solidFill>
               </a:rPr>
-              <a:t>Blue Button</a:t>
+              <a:t>GPIO</a:t>
             </a:r>
-            <a:endParaRPr sz="1300">
+            <a:endParaRPr sz="1100">
               <a:solidFill>
                 <a:schemeClr val="dk1"/>
               </a:solidFill>
@@ -20303,14 +20721,14 @@
       </p:sp>
       <p:sp>
         <p:nvSpPr>
-          <p:cNvPr id="420" name="Google Shape;420;p15"/>
+          <p:cNvPr id="428" name="Google Shape;428;p15"/>
           <p:cNvSpPr txBox="1"/>
           <p:nvPr/>
         </p:nvSpPr>
         <p:spPr>
           <a:xfrm>
-            <a:off x="6190150" y="2912425"/>
-            <a:ext cx="747600" cy="499800"/>
+            <a:off x="6199200" y="4771750"/>
+            <a:ext cx="993300" cy="462600"/>
           </a:xfrm>
           <a:prstGeom prst="rect">
             <a:avLst/>
@@ -20336,38 +20754,14 @@
               <a:buNone/>
             </a:pPr>
             <a:r>
-              <a:rPr lang="en-US" sz="1300">
+              <a:rPr lang="en-US" sz="1100">
                 <a:solidFill>
                   <a:schemeClr val="dk1"/>
                 </a:solidFill>
               </a:rPr>
               <a:t>GPIO</a:t>
             </a:r>
-            <a:endParaRPr sz="1300">
-              <a:solidFill>
-                <a:schemeClr val="dk1"/>
-              </a:solidFill>
-            </a:endParaRPr>
-          </a:p>
-          <a:p>
-            <a:pPr indent="0" lvl="0" marL="0" rtl="0" algn="l">
-              <a:spcBef>
-                <a:spcPts val="0"/>
-              </a:spcBef>
-              <a:spcAft>
-                <a:spcPts val="0"/>
-              </a:spcAft>
-              <a:buNone/>
-            </a:pPr>
-            <a:r>
-              <a:rPr lang="en-US" sz="1300">
-                <a:solidFill>
-                  <a:schemeClr val="dk1"/>
-                </a:solidFill>
-              </a:rPr>
-              <a:t>P2_2</a:t>
-            </a:r>
-            <a:endParaRPr sz="1300">
+            <a:endParaRPr sz="1100">
               <a:solidFill>
                 <a:schemeClr val="dk1"/>
               </a:solidFill>
@@ -20377,14 +20771,14 @@
       </p:sp>
       <p:sp>
         <p:nvSpPr>
-          <p:cNvPr id="421" name="Google Shape;421;p15"/>
+          <p:cNvPr id="429" name="Google Shape;429;p15"/>
           <p:cNvSpPr txBox="1"/>
           <p:nvPr/>
         </p:nvSpPr>
         <p:spPr>
           <a:xfrm>
-            <a:off x="6190150" y="3591700"/>
-            <a:ext cx="747600" cy="499800"/>
+            <a:off x="6178550" y="5351725"/>
+            <a:ext cx="993300" cy="462600"/>
           </a:xfrm>
           <a:prstGeom prst="rect">
             <a:avLst/>
@@ -20410,38 +20804,14 @@
               <a:buNone/>
             </a:pPr>
             <a:r>
-              <a:rPr lang="en-US" sz="1300">
+              <a:rPr lang="en-US" sz="1100">
                 <a:solidFill>
                   <a:schemeClr val="dk1"/>
                 </a:solidFill>
               </a:rPr>
               <a:t>GPIO</a:t>
             </a:r>
-            <a:endParaRPr sz="1300">
-              <a:solidFill>
-                <a:schemeClr val="dk1"/>
-              </a:solidFill>
-            </a:endParaRPr>
-          </a:p>
-          <a:p>
-            <a:pPr indent="0" lvl="0" marL="0" rtl="0" algn="l">
-              <a:spcBef>
-                <a:spcPts val="0"/>
-              </a:spcBef>
-              <a:spcAft>
-                <a:spcPts val="0"/>
-              </a:spcAft>
-              <a:buNone/>
-            </a:pPr>
-            <a:r>
-              <a:rPr lang="en-US" sz="1300">
-                <a:solidFill>
-                  <a:schemeClr val="dk1"/>
-                </a:solidFill>
-              </a:rPr>
-              <a:t>P2_4</a:t>
-            </a:r>
-            <a:endParaRPr sz="1300">
+            <a:endParaRPr sz="1100">
               <a:solidFill>
                 <a:schemeClr val="dk1"/>
               </a:solidFill>
@@ -20451,14 +20821,14 @@
       </p:sp>
       <p:sp>
         <p:nvSpPr>
-          <p:cNvPr id="422" name="Google Shape;422;p15"/>
+          <p:cNvPr id="430" name="Google Shape;430;p15"/>
           <p:cNvSpPr txBox="1"/>
           <p:nvPr/>
         </p:nvSpPr>
         <p:spPr>
           <a:xfrm>
-            <a:off x="6313000" y="4532725"/>
-            <a:ext cx="747600" cy="499800"/>
+            <a:off x="6178550" y="3008288"/>
+            <a:ext cx="993300" cy="462600"/>
           </a:xfrm>
           <a:prstGeom prst="rect">
             <a:avLst/>
@@ -20484,90 +20854,14 @@
               <a:buNone/>
             </a:pPr>
             <a:r>
-              <a:rPr lang="en-US" sz="1300">
+              <a:rPr lang="en-US" sz="1100">
                 <a:solidFill>
                   <a:schemeClr val="dk1"/>
                 </a:solidFill>
               </a:rPr>
               <a:t>USB</a:t>
             </a:r>
-            <a:endParaRPr sz="1300">
-              <a:solidFill>
-                <a:schemeClr val="dk1"/>
-              </a:solidFill>
-            </a:endParaRPr>
-          </a:p>
-        </p:txBody>
-      </p:sp>
-      <p:cxnSp>
-        <p:nvCxnSpPr>
-          <p:cNvPr id="423" name="Google Shape;423;p15"/>
-          <p:cNvCxnSpPr/>
-          <p:nvPr/>
-        </p:nvCxnSpPr>
-        <p:spPr>
-          <a:xfrm rot="10800000">
-            <a:off x="5201375" y="4983100"/>
-            <a:ext cx="993300" cy="0"/>
-          </a:xfrm>
-          <a:prstGeom prst="straightConnector1">
-            <a:avLst/>
-          </a:prstGeom>
-          <a:noFill/>
-          <a:ln cap="flat" cmpd="sng" w="9525">
-            <a:solidFill>
-              <a:schemeClr val="dk2"/>
-            </a:solidFill>
-            <a:prstDash val="solid"/>
-            <a:round/>
-            <a:headEnd len="med" w="med" type="none"/>
-            <a:tailEnd len="med" w="med" type="none"/>
-          </a:ln>
-        </p:spPr>
-      </p:cxnSp>
-      <p:sp>
-        <p:nvSpPr>
-          <p:cNvPr id="424" name="Google Shape;424;p15"/>
-          <p:cNvSpPr txBox="1"/>
-          <p:nvPr/>
-        </p:nvSpPr>
-        <p:spPr>
-          <a:xfrm>
-            <a:off x="4380875" y="4757800"/>
-            <a:ext cx="945000" cy="225300"/>
-          </a:xfrm>
-          <a:prstGeom prst="rect">
-            <a:avLst/>
-          </a:prstGeom>
-          <a:noFill/>
-          <a:ln>
-            <a:noFill/>
-          </a:ln>
-        </p:spPr>
-        <p:txBody>
-          <a:bodyPr anchorCtr="0" anchor="t" bIns="91425" lIns="91425" spcFirstLastPara="1" rIns="91425" wrap="square" tIns="91425">
-            <a:noAutofit/>
-          </a:bodyPr>
-          <a:lstStyle/>
-          <a:p>
-            <a:pPr indent="0" lvl="0" marL="0" rtl="0" algn="l">
-              <a:spcBef>
-                <a:spcPts val="0"/>
-              </a:spcBef>
-              <a:spcAft>
-                <a:spcPts val="0"/>
-              </a:spcAft>
-              <a:buNone/>
-            </a:pPr>
-            <a:r>
-              <a:rPr lang="en-US" sz="1300">
-                <a:solidFill>
-                  <a:schemeClr val="dk1"/>
-                </a:solidFill>
-              </a:rPr>
-              <a:t>USB Mic</a:t>
-            </a:r>
-            <a:endParaRPr sz="1300">
+            <a:endParaRPr sz="1100">
               <a:solidFill>
                 <a:schemeClr val="dk1"/>
               </a:solidFill>
@@ -20600,7 +20894,7 @@
   <p:cSld>
     <p:spTree>
       <p:nvGrpSpPr>
-        <p:cNvPr id="428" name="Shape 428"/>
+        <p:cNvPr id="434" name="Shape 434"/>
         <p:cNvGrpSpPr/>
         <p:nvPr/>
       </p:nvGrpSpPr>
@@ -20614,7 +20908,7 @@
       </p:grpSpPr>
       <p:sp>
         <p:nvSpPr>
-          <p:cNvPr id="429" name="Google Shape;429;p16"/>
+          <p:cNvPr id="435" name="Google Shape;435;p16"/>
           <p:cNvSpPr txBox="1"/>
           <p:nvPr>
             <p:ph type="title"/>
@@ -20666,14 +20960,14 @@
       </p:sp>
       <p:sp>
         <p:nvSpPr>
-          <p:cNvPr id="430" name="Google Shape;430;p16"/>
+          <p:cNvPr id="436" name="Google Shape;436;p16"/>
           <p:cNvSpPr/>
           <p:nvPr/>
         </p:nvSpPr>
         <p:spPr>
           <a:xfrm>
-            <a:off x="6178700" y="1501350"/>
-            <a:ext cx="3732900" cy="3855300"/>
+            <a:off x="5058550" y="1364175"/>
+            <a:ext cx="3732900" cy="4362300"/>
           </a:xfrm>
           <a:prstGeom prst="rect">
             <a:avLst/>
@@ -20715,13 +21009,13 @@
       </p:sp>
       <p:sp>
         <p:nvSpPr>
-          <p:cNvPr id="431" name="Google Shape;431;p16"/>
+          <p:cNvPr id="437" name="Google Shape;437;p16"/>
           <p:cNvSpPr txBox="1"/>
           <p:nvPr/>
         </p:nvSpPr>
         <p:spPr>
           <a:xfrm>
-            <a:off x="6711650" y="2095500"/>
+            <a:off x="5591500" y="1958325"/>
             <a:ext cx="2667000" cy="462600"/>
           </a:xfrm>
           <a:prstGeom prst="rect">
@@ -20765,13 +21059,13 @@
       </p:sp>
       <p:cxnSp>
         <p:nvCxnSpPr>
-          <p:cNvPr id="432" name="Google Shape;432;p16"/>
+          <p:cNvPr id="438" name="Google Shape;438;p16"/>
           <p:cNvCxnSpPr/>
           <p:nvPr/>
         </p:nvCxnSpPr>
         <p:spPr>
           <a:xfrm rot="10800000">
-            <a:off x="5196850" y="1932225"/>
+            <a:off x="4076700" y="1642650"/>
             <a:ext cx="993300" cy="0"/>
           </a:xfrm>
           <a:prstGeom prst="straightConnector1">
@@ -20791,13 +21085,13 @@
       </p:cxnSp>
       <p:cxnSp>
         <p:nvCxnSpPr>
-          <p:cNvPr id="433" name="Google Shape;433;p16"/>
+          <p:cNvPr id="439" name="Google Shape;439;p16"/>
           <p:cNvCxnSpPr/>
           <p:nvPr/>
         </p:nvCxnSpPr>
         <p:spPr>
           <a:xfrm rot="10800000">
-            <a:off x="1168200" y="2044825"/>
+            <a:off x="2117100" y="1819075"/>
             <a:ext cx="993300" cy="0"/>
           </a:xfrm>
           <a:prstGeom prst="straightConnector1">
@@ -20817,13 +21111,13 @@
       </p:cxnSp>
       <p:cxnSp>
         <p:nvCxnSpPr>
-          <p:cNvPr id="434" name="Google Shape;434;p16"/>
+          <p:cNvPr id="440" name="Google Shape;440;p16"/>
           <p:cNvCxnSpPr/>
           <p:nvPr/>
         </p:nvCxnSpPr>
         <p:spPr>
           <a:xfrm rot="10800000">
-            <a:off x="5196850" y="3162325"/>
+            <a:off x="4076700" y="2270775"/>
             <a:ext cx="993300" cy="0"/>
           </a:xfrm>
           <a:prstGeom prst="straightConnector1">
@@ -20843,13 +21137,13 @@
       </p:cxnSp>
       <p:cxnSp>
         <p:nvCxnSpPr>
-          <p:cNvPr id="435" name="Google Shape;435;p16"/>
+          <p:cNvPr id="441" name="Google Shape;441;p16"/>
           <p:cNvCxnSpPr/>
           <p:nvPr/>
         </p:nvCxnSpPr>
         <p:spPr>
           <a:xfrm rot="10800000">
-            <a:off x="5196850" y="3954250"/>
+            <a:off x="4081225" y="3025150"/>
             <a:ext cx="993300" cy="0"/>
           </a:xfrm>
           <a:prstGeom prst="straightConnector1">
@@ -20869,14 +21163,14 @@
       </p:cxnSp>
       <p:sp>
         <p:nvSpPr>
-          <p:cNvPr id="436" name="Google Shape;436;p16"/>
+          <p:cNvPr id="442" name="Google Shape;442;p16"/>
           <p:cNvSpPr txBox="1"/>
           <p:nvPr/>
         </p:nvSpPr>
         <p:spPr>
           <a:xfrm>
-            <a:off x="6190150" y="1705650"/>
-            <a:ext cx="993300" cy="327600"/>
+            <a:off x="5038750" y="1452488"/>
+            <a:ext cx="993300" cy="462600"/>
           </a:xfrm>
           <a:prstGeom prst="rect">
             <a:avLst/>
@@ -20907,31 +21201,7 @@
                   <a:schemeClr val="dk1"/>
                 </a:solidFill>
               </a:rPr>
-              <a:t>PWM/GPIO</a:t>
-            </a:r>
-            <a:endParaRPr sz="1100">
-              <a:solidFill>
-                <a:schemeClr val="dk1"/>
-              </a:solidFill>
-            </a:endParaRPr>
-          </a:p>
-          <a:p>
-            <a:pPr indent="0" lvl="0" marL="0" rtl="0" algn="l">
-              <a:spcBef>
-                <a:spcPts val="0"/>
-              </a:spcBef>
-              <a:spcAft>
-                <a:spcPts val="0"/>
-              </a:spcAft>
-              <a:buNone/>
-            </a:pPr>
-            <a:r>
-              <a:rPr lang="en-US" sz="1100">
-                <a:solidFill>
-                  <a:schemeClr val="dk1"/>
-                </a:solidFill>
-              </a:rPr>
-              <a:t>P2_1</a:t>
+              <a:t>SYS</a:t>
             </a:r>
             <a:endParaRPr sz="1100">
               <a:solidFill>
@@ -20943,256 +21213,13 @@
       </p:sp>
       <p:sp>
         <p:nvSpPr>
-          <p:cNvPr id="437" name="Google Shape;437;p16"/>
+          <p:cNvPr id="443" name="Google Shape;443;p16"/>
           <p:cNvSpPr/>
           <p:nvPr/>
         </p:nvSpPr>
         <p:spPr>
           <a:xfrm>
-            <a:off x="4055800" y="1689925"/>
-            <a:ext cx="1141200" cy="462600"/>
-          </a:xfrm>
-          <a:prstGeom prst="rect">
-            <a:avLst/>
-          </a:prstGeom>
-          <a:solidFill>
-            <a:schemeClr val="lt2"/>
-          </a:solidFill>
-          <a:ln cap="flat" cmpd="sng" w="9525">
-            <a:solidFill>
-              <a:schemeClr val="dk2"/>
-            </a:solidFill>
-            <a:prstDash val="solid"/>
-            <a:round/>
-            <a:headEnd len="sm" w="sm" type="none"/>
-            <a:tailEnd len="sm" w="sm" type="none"/>
-          </a:ln>
-        </p:spPr>
-        <p:txBody>
-          <a:bodyPr anchorCtr="0" anchor="ctr" bIns="91425" lIns="91425" spcFirstLastPara="1" rIns="91425" wrap="square" tIns="91425">
-            <a:noAutofit/>
-          </a:bodyPr>
-          <a:lstStyle/>
-          <a:p>
-            <a:pPr indent="0" lvl="0" marL="0" rtl="0" algn="ctr">
-              <a:spcBef>
-                <a:spcPts val="0"/>
-              </a:spcBef>
-              <a:spcAft>
-                <a:spcPts val="0"/>
-              </a:spcAft>
-              <a:buNone/>
-            </a:pPr>
-            <a:r>
-              <a:rPr lang="en-US"/>
-              <a:t>Logic Shifter</a:t>
-            </a:r>
-            <a:endParaRPr/>
-          </a:p>
-        </p:txBody>
-      </p:sp>
-      <p:sp>
-        <p:nvSpPr>
-          <p:cNvPr id="438" name="Google Shape;438;p16"/>
-          <p:cNvSpPr txBox="1"/>
-          <p:nvPr/>
-        </p:nvSpPr>
-        <p:spPr>
-          <a:xfrm>
-            <a:off x="5273050" y="1676550"/>
-            <a:ext cx="993300" cy="116700"/>
-          </a:xfrm>
-          <a:prstGeom prst="rect">
-            <a:avLst/>
-          </a:prstGeom>
-          <a:noFill/>
-          <a:ln>
-            <a:noFill/>
-          </a:ln>
-        </p:spPr>
-        <p:txBody>
-          <a:bodyPr anchorCtr="0" anchor="t" bIns="91425" lIns="91425" spcFirstLastPara="1" rIns="91425" wrap="square" tIns="91425">
-            <a:noAutofit/>
-          </a:bodyPr>
-          <a:lstStyle/>
-          <a:p>
-            <a:pPr indent="0" lvl="0" marL="0" rtl="0" algn="l">
-              <a:spcBef>
-                <a:spcPts val="0"/>
-              </a:spcBef>
-              <a:spcAft>
-                <a:spcPts val="0"/>
-              </a:spcAft>
-              <a:buClr>
-                <a:schemeClr val="dk1"/>
-              </a:buClr>
-              <a:buSzPts val="1100"/>
-              <a:buFont typeface="Arial"/>
-              <a:buNone/>
-            </a:pPr>
-            <a:r>
-              <a:rPr lang="en-US" sz="1000">
-                <a:solidFill>
-                  <a:schemeClr val="dk1"/>
-                </a:solidFill>
-              </a:rPr>
-              <a:t>~</a:t>
-            </a:r>
-            <a:r>
-              <a:rPr lang="en-US" sz="1000">
-                <a:solidFill>
-                  <a:schemeClr val="dk1"/>
-                </a:solidFill>
-              </a:rPr>
-              <a:t>3.3V ~5mA</a:t>
-            </a:r>
-            <a:endParaRPr sz="1000">
-              <a:solidFill>
-                <a:schemeClr val="dk1"/>
-              </a:solidFill>
-            </a:endParaRPr>
-          </a:p>
-          <a:p>
-            <a:pPr indent="0" lvl="0" marL="0" rtl="0" algn="l">
-              <a:spcBef>
-                <a:spcPts val="0"/>
-              </a:spcBef>
-              <a:spcAft>
-                <a:spcPts val="0"/>
-              </a:spcAft>
-              <a:buNone/>
-            </a:pPr>
-            <a:r>
-              <a:t/>
-            </a:r>
-            <a:endParaRPr sz="1000">
-              <a:solidFill>
-                <a:schemeClr val="dk1"/>
-              </a:solidFill>
-            </a:endParaRPr>
-          </a:p>
-        </p:txBody>
-      </p:sp>
-      <p:cxnSp>
-        <p:nvCxnSpPr>
-          <p:cNvPr id="439" name="Google Shape;439;p16"/>
-          <p:cNvCxnSpPr/>
-          <p:nvPr/>
-        </p:nvCxnSpPr>
-        <p:spPr>
-          <a:xfrm rot="10800000">
-            <a:off x="3062500" y="1945650"/>
-            <a:ext cx="993300" cy="0"/>
-          </a:xfrm>
-          <a:prstGeom prst="straightConnector1">
-            <a:avLst/>
-          </a:prstGeom>
-          <a:noFill/>
-          <a:ln cap="flat" cmpd="sng" w="9525">
-            <a:solidFill>
-              <a:schemeClr val="dk2"/>
-            </a:solidFill>
-            <a:prstDash val="solid"/>
-            <a:round/>
-            <a:headEnd len="med" w="med" type="none"/>
-            <a:tailEnd len="med" w="med" type="none"/>
-          </a:ln>
-        </p:spPr>
-      </p:cxnSp>
-      <p:sp>
-        <p:nvSpPr>
-          <p:cNvPr id="440" name="Google Shape;440;p16"/>
-          <p:cNvSpPr txBox="1"/>
-          <p:nvPr/>
-        </p:nvSpPr>
-        <p:spPr>
-          <a:xfrm>
-            <a:off x="3250125" y="1698925"/>
-            <a:ext cx="993300" cy="116700"/>
-          </a:xfrm>
-          <a:prstGeom prst="rect">
-            <a:avLst/>
-          </a:prstGeom>
-          <a:noFill/>
-          <a:ln>
-            <a:noFill/>
-          </a:ln>
-        </p:spPr>
-        <p:txBody>
-          <a:bodyPr anchorCtr="0" anchor="t" bIns="91425" lIns="91425" spcFirstLastPara="1" rIns="91425" wrap="square" tIns="91425">
-            <a:noAutofit/>
-          </a:bodyPr>
-          <a:lstStyle/>
-          <a:p>
-            <a:pPr indent="0" lvl="0" marL="0" rtl="0" algn="l">
-              <a:spcBef>
-                <a:spcPts val="0"/>
-              </a:spcBef>
-              <a:spcAft>
-                <a:spcPts val="0"/>
-              </a:spcAft>
-              <a:buNone/>
-            </a:pPr>
-            <a:r>
-              <a:rPr lang="en-US" sz="1000">
-                <a:solidFill>
-                  <a:schemeClr val="dk1"/>
-                </a:solidFill>
-              </a:rPr>
-              <a:t>~5</a:t>
-            </a:r>
-            <a:r>
-              <a:rPr lang="en-US" sz="1000">
-                <a:solidFill>
-                  <a:schemeClr val="dk1"/>
-                </a:solidFill>
-              </a:rPr>
-              <a:t>V ~</a:t>
-            </a:r>
-            <a:r>
-              <a:rPr lang="en-US" sz="1000">
-                <a:solidFill>
-                  <a:schemeClr val="dk1"/>
-                </a:solidFill>
-              </a:rPr>
-              <a:t>5mA</a:t>
-            </a:r>
-            <a:endParaRPr sz="1000">
-              <a:solidFill>
-                <a:schemeClr val="dk1"/>
-              </a:solidFill>
-            </a:endParaRPr>
-          </a:p>
-          <a:p>
-            <a:pPr indent="0" lvl="0" marL="0" rtl="0" algn="l">
-              <a:spcBef>
-                <a:spcPts val="0"/>
-              </a:spcBef>
-              <a:spcAft>
-                <a:spcPts val="0"/>
-              </a:spcAft>
-              <a:buNone/>
-            </a:pPr>
-            <a:r>
-              <a:t/>
-            </a:r>
-            <a:endParaRPr sz="1000">
-              <a:solidFill>
-                <a:schemeClr val="dk1"/>
-              </a:solidFill>
-            </a:endParaRPr>
-          </a:p>
-        </p:txBody>
-      </p:sp>
-      <p:sp>
-        <p:nvSpPr>
-          <p:cNvPr id="441" name="Google Shape;441;p16"/>
-          <p:cNvSpPr/>
-          <p:nvPr/>
-        </p:nvSpPr>
-        <p:spPr>
-          <a:xfrm>
-            <a:off x="2182800" y="1680600"/>
+            <a:off x="3131700" y="1531050"/>
             <a:ext cx="945000" cy="528000"/>
           </a:xfrm>
           <a:prstGeom prst="rect">
@@ -21236,13 +21263,13 @@
       </p:sp>
       <p:cxnSp>
         <p:nvCxnSpPr>
-          <p:cNvPr id="442" name="Google Shape;442;p16"/>
+          <p:cNvPr id="444" name="Google Shape;444;p16"/>
           <p:cNvCxnSpPr/>
           <p:nvPr/>
         </p:nvCxnSpPr>
         <p:spPr>
           <a:xfrm rot="10800000">
-            <a:off x="1168200" y="1869450"/>
+            <a:off x="4081225" y="4845925"/>
             <a:ext cx="993300" cy="0"/>
           </a:xfrm>
           <a:prstGeom prst="straightConnector1">
@@ -21262,14 +21289,214 @@
       </p:cxnSp>
       <p:sp>
         <p:nvSpPr>
-          <p:cNvPr id="443" name="Google Shape;443;p16"/>
+          <p:cNvPr id="445" name="Google Shape;445;p16"/>
+          <p:cNvSpPr/>
+          <p:nvPr/>
+        </p:nvSpPr>
+        <p:spPr>
+          <a:xfrm>
+            <a:off x="1205000" y="1531050"/>
+            <a:ext cx="945000" cy="528000"/>
+          </a:xfrm>
+          <a:prstGeom prst="rect">
+            <a:avLst/>
+          </a:prstGeom>
+          <a:solidFill>
+            <a:schemeClr val="lt2"/>
+          </a:solidFill>
+          <a:ln cap="flat" cmpd="sng" w="9525">
+            <a:solidFill>
+              <a:schemeClr val="dk2"/>
+            </a:solidFill>
+            <a:prstDash val="solid"/>
+            <a:round/>
+            <a:headEnd len="sm" w="sm" type="none"/>
+            <a:tailEnd len="sm" w="sm" type="none"/>
+          </a:ln>
+        </p:spPr>
+        <p:txBody>
+          <a:bodyPr anchorCtr="0" anchor="ctr" bIns="91425" lIns="91425" spcFirstLastPara="1" rIns="91425" wrap="square" tIns="91425">
+            <a:noAutofit/>
+          </a:bodyPr>
+          <a:lstStyle/>
+          <a:p>
+            <a:pPr indent="0" lvl="0" marL="0" rtl="0" algn="ctr">
+              <a:spcBef>
+                <a:spcPts val="0"/>
+              </a:spcBef>
+              <a:spcAft>
+                <a:spcPts val="0"/>
+              </a:spcAft>
+              <a:buNone/>
+            </a:pPr>
+            <a:r>
+              <a:rPr lang="en-US" sz="1200"/>
+              <a:t>DC Motor</a:t>
+            </a:r>
+            <a:endParaRPr sz="1200"/>
+          </a:p>
+        </p:txBody>
+      </p:sp>
+      <p:sp>
+        <p:nvSpPr>
+          <p:cNvPr id="446" name="Google Shape;446;p16"/>
+          <p:cNvSpPr/>
+          <p:nvPr/>
+        </p:nvSpPr>
+        <p:spPr>
+          <a:xfrm>
+            <a:off x="3131700" y="2147450"/>
+            <a:ext cx="945000" cy="528000"/>
+          </a:xfrm>
+          <a:prstGeom prst="rect">
+            <a:avLst/>
+          </a:prstGeom>
+          <a:solidFill>
+            <a:schemeClr val="lt2"/>
+          </a:solidFill>
+          <a:ln cap="flat" cmpd="sng" w="9525">
+            <a:solidFill>
+              <a:schemeClr val="dk2"/>
+            </a:solidFill>
+            <a:prstDash val="solid"/>
+            <a:round/>
+            <a:headEnd len="sm" w="sm" type="none"/>
+            <a:tailEnd len="sm" w="sm" type="none"/>
+          </a:ln>
+        </p:spPr>
+        <p:txBody>
+          <a:bodyPr anchorCtr="0" anchor="ctr" bIns="91425" lIns="91425" spcFirstLastPara="1" rIns="91425" wrap="square" tIns="91425">
+            <a:noAutofit/>
+          </a:bodyPr>
+          <a:lstStyle/>
+          <a:p>
+            <a:pPr indent="0" lvl="0" marL="0" rtl="0" algn="ctr">
+              <a:spcBef>
+                <a:spcPts val="0"/>
+              </a:spcBef>
+              <a:spcAft>
+                <a:spcPts val="0"/>
+              </a:spcAft>
+              <a:buNone/>
+            </a:pPr>
+            <a:r>
+              <a:rPr lang="en-US" sz="1200"/>
+              <a:t>CRM</a:t>
+            </a:r>
+            <a:endParaRPr sz="1200"/>
+          </a:p>
+        </p:txBody>
+      </p:sp>
+      <p:sp>
+        <p:nvSpPr>
+          <p:cNvPr id="447" name="Google Shape;447;p16"/>
+          <p:cNvSpPr/>
+          <p:nvPr/>
+        </p:nvSpPr>
+        <p:spPr>
+          <a:xfrm>
+            <a:off x="3131700" y="2763850"/>
+            <a:ext cx="945000" cy="528000"/>
+          </a:xfrm>
+          <a:prstGeom prst="rect">
+            <a:avLst/>
+          </a:prstGeom>
+          <a:solidFill>
+            <a:schemeClr val="lt2"/>
+          </a:solidFill>
+          <a:ln cap="flat" cmpd="sng" w="9525">
+            <a:solidFill>
+              <a:schemeClr val="dk2"/>
+            </a:solidFill>
+            <a:prstDash val="solid"/>
+            <a:round/>
+            <a:headEnd len="sm" w="sm" type="none"/>
+            <a:tailEnd len="sm" w="sm" type="none"/>
+          </a:ln>
+        </p:spPr>
+        <p:txBody>
+          <a:bodyPr anchorCtr="0" anchor="ctr" bIns="91425" lIns="91425" spcFirstLastPara="1" rIns="91425" wrap="square" tIns="91425">
+            <a:noAutofit/>
+          </a:bodyPr>
+          <a:lstStyle/>
+          <a:p>
+            <a:pPr indent="0" lvl="0" marL="0" rtl="0" algn="ctr">
+              <a:spcBef>
+                <a:spcPts val="0"/>
+              </a:spcBef>
+              <a:spcAft>
+                <a:spcPts val="0"/>
+              </a:spcAft>
+              <a:buNone/>
+            </a:pPr>
+            <a:r>
+              <a:rPr lang="en-US" sz="1200"/>
+              <a:t>Mic</a:t>
+            </a:r>
+            <a:endParaRPr sz="1200"/>
+          </a:p>
+        </p:txBody>
+      </p:sp>
+      <p:sp>
+        <p:nvSpPr>
+          <p:cNvPr id="448" name="Google Shape;448;p16"/>
+          <p:cNvSpPr/>
+          <p:nvPr/>
+        </p:nvSpPr>
+        <p:spPr>
+          <a:xfrm>
+            <a:off x="2198975" y="4139725"/>
+            <a:ext cx="1882200" cy="1412400"/>
+          </a:xfrm>
+          <a:prstGeom prst="rect">
+            <a:avLst/>
+          </a:prstGeom>
+          <a:solidFill>
+            <a:schemeClr val="lt2"/>
+          </a:solidFill>
+          <a:ln cap="flat" cmpd="sng" w="9525">
+            <a:solidFill>
+              <a:schemeClr val="dk2"/>
+            </a:solidFill>
+            <a:prstDash val="solid"/>
+            <a:round/>
+            <a:headEnd len="sm" w="sm" type="none"/>
+            <a:tailEnd len="sm" w="sm" type="none"/>
+          </a:ln>
+        </p:spPr>
+        <p:txBody>
+          <a:bodyPr anchorCtr="0" anchor="ctr" bIns="91425" lIns="91425" spcFirstLastPara="1" rIns="91425" wrap="square" tIns="91425">
+            <a:noAutofit/>
+          </a:bodyPr>
+          <a:lstStyle/>
+          <a:p>
+            <a:pPr indent="0" lvl="0" marL="0" rtl="0" algn="ctr">
+              <a:spcBef>
+                <a:spcPts val="0"/>
+              </a:spcBef>
+              <a:spcAft>
+                <a:spcPts val="0"/>
+              </a:spcAft>
+              <a:buNone/>
+            </a:pPr>
+            <a:r>
+              <a:rPr lang="en-US" sz="1200"/>
+              <a:t>Buttons/LEDS/Buzzer/IR Sensor</a:t>
+            </a:r>
+            <a:endParaRPr sz="1200"/>
+          </a:p>
+        </p:txBody>
+      </p:sp>
+      <p:sp>
+        <p:nvSpPr>
+          <p:cNvPr id="449" name="Google Shape;449;p16"/>
           <p:cNvSpPr txBox="1"/>
           <p:nvPr/>
         </p:nvSpPr>
         <p:spPr>
           <a:xfrm>
-            <a:off x="586700" y="1705650"/>
-            <a:ext cx="614400" cy="327600"/>
+            <a:off x="5038750" y="2102588"/>
+            <a:ext cx="993300" cy="462600"/>
           </a:xfrm>
           <a:prstGeom prst="rect">
             <a:avLst/>
@@ -21300,9 +21527,9 @@
                   <a:schemeClr val="dk1"/>
                 </a:solidFill>
               </a:rPr>
-              <a:t>DC Motors</a:t>
+              <a:t>SYS</a:t>
             </a:r>
-            <a:endParaRPr sz="400">
+            <a:endParaRPr sz="1100">
               <a:solidFill>
                 <a:schemeClr val="dk1"/>
               </a:solidFill>
@@ -21312,14 +21539,14 @@
       </p:sp>
       <p:sp>
         <p:nvSpPr>
-          <p:cNvPr id="444" name="Google Shape;444;p16"/>
+          <p:cNvPr id="450" name="Google Shape;450;p16"/>
           <p:cNvSpPr txBox="1"/>
           <p:nvPr/>
         </p:nvSpPr>
         <p:spPr>
           <a:xfrm>
-            <a:off x="1156100" y="1622725"/>
-            <a:ext cx="1389600" cy="167700"/>
+            <a:off x="5074575" y="4669850"/>
+            <a:ext cx="993300" cy="462600"/>
           </a:xfrm>
           <a:prstGeom prst="rect">
             <a:avLst/>
@@ -21350,15 +21577,7 @@
                   <a:schemeClr val="dk1"/>
                 </a:solidFill>
               </a:rPr>
-              <a:t>~5V ~</a:t>
-            </a:r>
-            <a:r>
-              <a:rPr lang="en-US" sz="1100">
-                <a:solidFill>
-                  <a:schemeClr val="dk1"/>
-                </a:solidFill>
-              </a:rPr>
-              <a:t>150mA</a:t>
+              <a:t>3.3V</a:t>
             </a:r>
             <a:endParaRPr sz="1100">
               <a:solidFill>
@@ -21370,14 +21589,14 @@
       </p:sp>
       <p:sp>
         <p:nvSpPr>
-          <p:cNvPr id="445" name="Google Shape;445;p16"/>
+          <p:cNvPr id="451" name="Google Shape;451;p16"/>
           <p:cNvSpPr txBox="1"/>
           <p:nvPr/>
         </p:nvSpPr>
         <p:spPr>
           <a:xfrm>
-            <a:off x="5245150" y="2884888"/>
-            <a:ext cx="945000" cy="116700"/>
+            <a:off x="5058400" y="2871113"/>
+            <a:ext cx="993300" cy="462600"/>
           </a:xfrm>
           <a:prstGeom prst="rect">
             <a:avLst/>
@@ -21408,7 +21627,7 @@
                   <a:schemeClr val="dk1"/>
                 </a:solidFill>
               </a:rPr>
-              <a:t>~5V </a:t>
+              <a:t>USB/SYS</a:t>
             </a:r>
             <a:endParaRPr sz="1100">
               <a:solidFill>
@@ -21420,14 +21639,14 @@
       </p:sp>
       <p:sp>
         <p:nvSpPr>
-          <p:cNvPr id="446" name="Google Shape;446;p16"/>
+          <p:cNvPr id="452" name="Google Shape;452;p16"/>
           <p:cNvSpPr txBox="1"/>
           <p:nvPr/>
         </p:nvSpPr>
         <p:spPr>
           <a:xfrm>
-            <a:off x="4243425" y="2648450"/>
-            <a:ext cx="945000" cy="225300"/>
+            <a:off x="8247725" y="1659238"/>
+            <a:ext cx="993300" cy="462600"/>
           </a:xfrm>
           <a:prstGeom prst="rect">
             <a:avLst/>
@@ -21453,136 +21672,12 @@
               <a:buNone/>
             </a:pPr>
             <a:r>
-              <a:rPr lang="en-US" sz="1300">
-                <a:solidFill>
-                  <a:schemeClr val="dk1"/>
-                </a:solidFill>
-              </a:rPr>
-              <a:t>Yellow Button (Product ID 1186)</a:t>
-            </a:r>
-            <a:endParaRPr sz="1300">
-              <a:solidFill>
-                <a:schemeClr val="dk1"/>
-              </a:solidFill>
-            </a:endParaRPr>
-          </a:p>
-        </p:txBody>
-      </p:sp>
-      <p:sp>
-        <p:nvSpPr>
-          <p:cNvPr id="447" name="Google Shape;447;p16"/>
-          <p:cNvSpPr txBox="1"/>
-          <p:nvPr/>
-        </p:nvSpPr>
-        <p:spPr>
-          <a:xfrm>
-            <a:off x="4300150" y="3728950"/>
-            <a:ext cx="945000" cy="225300"/>
-          </a:xfrm>
-          <a:prstGeom prst="rect">
-            <a:avLst/>
-          </a:prstGeom>
-          <a:noFill/>
-          <a:ln>
-            <a:noFill/>
-          </a:ln>
-        </p:spPr>
-        <p:txBody>
-          <a:bodyPr anchorCtr="0" anchor="t" bIns="91425" lIns="91425" spcFirstLastPara="1" rIns="91425" wrap="square" tIns="91425">
-            <a:noAutofit/>
-          </a:bodyPr>
-          <a:lstStyle/>
-          <a:p>
-            <a:pPr indent="0" lvl="0" marL="0" rtl="0" algn="l">
-              <a:spcBef>
-                <a:spcPts val="0"/>
-              </a:spcBef>
-              <a:spcAft>
-                <a:spcPts val="0"/>
-              </a:spcAft>
-              <a:buNone/>
-            </a:pPr>
-            <a:r>
-              <a:rPr lang="en-US" sz="1300">
-                <a:solidFill>
-                  <a:schemeClr val="dk1"/>
-                </a:solidFill>
-              </a:rPr>
-              <a:t>Blue</a:t>
-            </a:r>
-            <a:r>
-              <a:rPr lang="en-US" sz="1300">
-                <a:solidFill>
-                  <a:schemeClr val="dk1"/>
-                </a:solidFill>
-              </a:rPr>
-              <a:t> Button </a:t>
-            </a:r>
-            <a:r>
-              <a:rPr lang="en-US" sz="1300">
-                <a:solidFill>
-                  <a:schemeClr val="dk1"/>
-                </a:solidFill>
-              </a:rPr>
-              <a:t>(Product ID 1186)</a:t>
-            </a:r>
-            <a:endParaRPr sz="1300">
-              <a:solidFill>
-                <a:schemeClr val="dk1"/>
-              </a:solidFill>
-            </a:endParaRPr>
-          </a:p>
-        </p:txBody>
-      </p:sp>
-      <p:sp>
-        <p:nvSpPr>
-          <p:cNvPr id="448" name="Google Shape;448;p16"/>
-          <p:cNvSpPr txBox="1"/>
-          <p:nvPr/>
-        </p:nvSpPr>
-        <p:spPr>
-          <a:xfrm>
-            <a:off x="5245150" y="3652738"/>
-            <a:ext cx="945000" cy="116700"/>
-          </a:xfrm>
-          <a:prstGeom prst="rect">
-            <a:avLst/>
-          </a:prstGeom>
-          <a:noFill/>
-          <a:ln>
-            <a:noFill/>
-          </a:ln>
-        </p:spPr>
-        <p:txBody>
-          <a:bodyPr anchorCtr="0" anchor="t" bIns="91425" lIns="91425" spcFirstLastPara="1" rIns="91425" wrap="square" tIns="91425">
-            <a:noAutofit/>
-          </a:bodyPr>
-          <a:lstStyle/>
-          <a:p>
-            <a:pPr indent="0" lvl="0" marL="0" rtl="0" algn="l">
-              <a:spcBef>
-                <a:spcPts val="0"/>
-              </a:spcBef>
-              <a:spcAft>
-                <a:spcPts val="0"/>
-              </a:spcAft>
-              <a:buNone/>
-            </a:pPr>
-            <a:r>
               <a:rPr lang="en-US" sz="1100">
                 <a:solidFill>
                   <a:schemeClr val="dk1"/>
                 </a:solidFill>
               </a:rPr>
-              <a:t>~</a:t>
-            </a:r>
-            <a:r>
-              <a:rPr lang="en-US" sz="1100">
-                <a:solidFill>
-                  <a:schemeClr val="dk1"/>
-                </a:solidFill>
-              </a:rPr>
-              <a:t>5V </a:t>
+              <a:t>SYS</a:t>
             </a:r>
             <a:endParaRPr sz="1100">
               <a:solidFill>
@@ -21594,30 +21689,38 @@
       </p:sp>
       <p:sp>
         <p:nvSpPr>
-          <p:cNvPr id="449" name="Google Shape;449;p16"/>
-          <p:cNvSpPr txBox="1"/>
+          <p:cNvPr id="453" name="Google Shape;453;p16"/>
+          <p:cNvSpPr/>
           <p:nvPr/>
         </p:nvSpPr>
         <p:spPr>
           <a:xfrm>
-            <a:off x="6190150" y="3591700"/>
-            <a:ext cx="747600" cy="499800"/>
+            <a:off x="9773300" y="1555075"/>
+            <a:ext cx="945000" cy="528000"/>
           </a:xfrm>
           <a:prstGeom prst="rect">
             <a:avLst/>
           </a:prstGeom>
-          <a:noFill/>
-          <a:ln>
-            <a:noFill/>
+          <a:solidFill>
+            <a:schemeClr val="lt2"/>
+          </a:solidFill>
+          <a:ln cap="flat" cmpd="sng" w="9525">
+            <a:solidFill>
+              <a:schemeClr val="dk2"/>
+            </a:solidFill>
+            <a:prstDash val="solid"/>
+            <a:round/>
+            <a:headEnd len="sm" w="sm" type="none"/>
+            <a:tailEnd len="sm" w="sm" type="none"/>
           </a:ln>
         </p:spPr>
         <p:txBody>
-          <a:bodyPr anchorCtr="0" anchor="t" bIns="91425" lIns="91425" spcFirstLastPara="1" rIns="91425" wrap="square" tIns="91425">
+          <a:bodyPr anchorCtr="0" anchor="ctr" bIns="91425" lIns="91425" spcFirstLastPara="1" rIns="91425" wrap="square" tIns="91425">
             <a:noAutofit/>
           </a:bodyPr>
           <a:lstStyle/>
           <a:p>
-            <a:pPr indent="0" lvl="0" marL="0" rtl="0" algn="l">
+            <a:pPr indent="0" lvl="0" marL="0" rtl="0" algn="ctr">
               <a:spcBef>
                 <a:spcPts val="0"/>
               </a:spcBef>
@@ -21627,105 +21730,75 @@
               <a:buNone/>
             </a:pPr>
             <a:r>
-              <a:rPr lang="en-US" sz="1300">
-                <a:solidFill>
-                  <a:schemeClr val="dk1"/>
-                </a:solidFill>
-              </a:rPr>
-              <a:t>P2_13</a:t>
+              <a:rPr lang="en-US" sz="1200"/>
+              <a:t>5V</a:t>
             </a:r>
-            <a:endParaRPr sz="1300">
-              <a:solidFill>
-                <a:schemeClr val="dk1"/>
-              </a:solidFill>
-            </a:endParaRPr>
-          </a:p>
-          <a:p>
-            <a:pPr indent="0" lvl="0" marL="0" rtl="0" algn="l">
-              <a:spcBef>
-                <a:spcPts val="0"/>
-              </a:spcBef>
-              <a:spcAft>
-                <a:spcPts val="0"/>
-              </a:spcAft>
-              <a:buNone/>
-            </a:pPr>
-            <a:r>
-              <a:rPr lang="en-US" sz="1300">
-                <a:solidFill>
-                  <a:schemeClr val="dk1"/>
-                </a:solidFill>
-              </a:rPr>
-              <a:t>VOUT</a:t>
-            </a:r>
-            <a:endParaRPr sz="1300">
-              <a:solidFill>
-                <a:schemeClr val="dk1"/>
-              </a:solidFill>
-            </a:endParaRPr>
-          </a:p>
-        </p:txBody>
-      </p:sp>
-      <p:sp>
-        <p:nvSpPr>
-          <p:cNvPr id="450" name="Google Shape;450;p16"/>
-          <p:cNvSpPr txBox="1"/>
-          <p:nvPr/>
-        </p:nvSpPr>
-        <p:spPr>
-          <a:xfrm>
-            <a:off x="6270875" y="4733200"/>
-            <a:ext cx="747600" cy="499800"/>
-          </a:xfrm>
-          <a:prstGeom prst="rect">
-            <a:avLst/>
-          </a:prstGeom>
-          <a:noFill/>
-          <a:ln>
-            <a:noFill/>
-          </a:ln>
-        </p:spPr>
-        <p:txBody>
-          <a:bodyPr anchorCtr="0" anchor="t" bIns="91425" lIns="91425" spcFirstLastPara="1" rIns="91425" wrap="square" tIns="91425">
-            <a:noAutofit/>
-          </a:bodyPr>
-          <a:lstStyle/>
-          <a:p>
-            <a:pPr indent="0" lvl="0" marL="0" rtl="0" algn="l">
-              <a:spcBef>
-                <a:spcPts val="0"/>
-              </a:spcBef>
-              <a:spcAft>
-                <a:spcPts val="0"/>
-              </a:spcAft>
-              <a:buNone/>
-            </a:pPr>
-            <a:r>
-              <a:rPr lang="en-US" sz="1300">
-                <a:solidFill>
-                  <a:schemeClr val="dk1"/>
-                </a:solidFill>
-              </a:rPr>
-              <a:t>USB Port</a:t>
-            </a:r>
-            <a:endParaRPr sz="1300">
-              <a:solidFill>
-                <a:schemeClr val="dk1"/>
-              </a:solidFill>
-            </a:endParaRPr>
+            <a:endParaRPr sz="1200"/>
           </a:p>
         </p:txBody>
       </p:sp>
       <p:cxnSp>
         <p:nvCxnSpPr>
-          <p:cNvPr id="451" name="Google Shape;451;p16"/>
+          <p:cNvPr id="454" name="Google Shape;454;p16"/>
           <p:cNvCxnSpPr/>
           <p:nvPr/>
         </p:nvCxnSpPr>
         <p:spPr>
           <a:xfrm rot="10800000">
-            <a:off x="5201375" y="4983100"/>
+            <a:off x="8791450" y="1819075"/>
             <a:ext cx="993300" cy="0"/>
+          </a:xfrm>
+          <a:prstGeom prst="straightConnector1">
+            <a:avLst/>
+          </a:prstGeom>
+          <a:noFill/>
+          <a:ln cap="flat" cmpd="sng" w="9525">
+            <a:solidFill>
+              <a:schemeClr val="dk2"/>
+            </a:solidFill>
+            <a:prstDash val="solid"/>
+            <a:round/>
+            <a:headEnd len="med" w="med" type="none"/>
+            <a:tailEnd len="med" w="med" type="none"/>
+          </a:ln>
+        </p:spPr>
+      </p:cxnSp>
+      <p:cxnSp>
+        <p:nvCxnSpPr>
+          <p:cNvPr id="455" name="Google Shape;455;p16"/>
+          <p:cNvCxnSpPr/>
+          <p:nvPr/>
+        </p:nvCxnSpPr>
+        <p:spPr>
+          <a:xfrm flipH="1" rot="10800000">
+            <a:off x="4409725" y="2567825"/>
+            <a:ext cx="26700" cy="2277000"/>
+          </a:xfrm>
+          <a:prstGeom prst="straightConnector1">
+            <a:avLst/>
+          </a:prstGeom>
+          <a:noFill/>
+          <a:ln cap="flat" cmpd="sng" w="9525">
+            <a:solidFill>
+              <a:schemeClr val="dk2"/>
+            </a:solidFill>
+            <a:prstDash val="solid"/>
+            <a:round/>
+            <a:headEnd len="med" w="med" type="none"/>
+            <a:tailEnd len="med" w="med" type="none"/>
+          </a:ln>
+        </p:spPr>
+      </p:cxnSp>
+      <p:cxnSp>
+        <p:nvCxnSpPr>
+          <p:cNvPr id="456" name="Google Shape;456;p16"/>
+          <p:cNvCxnSpPr/>
+          <p:nvPr/>
+        </p:nvCxnSpPr>
+        <p:spPr>
+          <a:xfrm flipH="1">
+            <a:off x="4085300" y="2575275"/>
+            <a:ext cx="359700" cy="3300"/>
           </a:xfrm>
           <a:prstGeom prst="straightConnector1">
             <a:avLst/>
@@ -21744,14 +21817,14 @@
       </p:cxnSp>
       <p:sp>
         <p:nvSpPr>
-          <p:cNvPr id="452" name="Google Shape;452;p16"/>
+          <p:cNvPr id="457" name="Google Shape;457;p16"/>
           <p:cNvSpPr txBox="1"/>
           <p:nvPr/>
         </p:nvSpPr>
         <p:spPr>
           <a:xfrm>
-            <a:off x="4380875" y="4757800"/>
-            <a:ext cx="945000" cy="225300"/>
+            <a:off x="4282925" y="2111475"/>
+            <a:ext cx="486300" cy="101400"/>
           </a:xfrm>
           <a:prstGeom prst="rect">
             <a:avLst/>
@@ -21777,14 +21850,9 @@
               <a:buNone/>
             </a:pPr>
             <a:r>
-              <a:rPr lang="en-US" sz="1300">
-                <a:solidFill>
-                  <a:schemeClr val="dk1"/>
-                </a:solidFill>
-              </a:rPr>
-              <a:t>USB Mic</a:t>
+              <a:t/>
             </a:r>
-            <a:endParaRPr sz="1300">
+            <a:endParaRPr sz="2000">
               <a:solidFill>
                 <a:schemeClr val="dk1"/>
               </a:solidFill>
@@ -21794,14 +21862,14 @@
       </p:sp>
       <p:sp>
         <p:nvSpPr>
-          <p:cNvPr id="453" name="Google Shape;453;p16"/>
+          <p:cNvPr id="458" name="Google Shape;458;p16"/>
           <p:cNvSpPr txBox="1"/>
           <p:nvPr/>
         </p:nvSpPr>
         <p:spPr>
           <a:xfrm>
-            <a:off x="5325875" y="4681588"/>
-            <a:ext cx="945000" cy="116700"/>
+            <a:off x="4205700" y="2006163"/>
+            <a:ext cx="993300" cy="462600"/>
           </a:xfrm>
           <a:prstGeom prst="rect">
             <a:avLst/>
@@ -21832,23 +21900,7 @@
                   <a:schemeClr val="dk1"/>
                 </a:solidFill>
               </a:rPr>
-              <a:t>~</a:t>
-            </a:r>
-            <a:r>
-              <a:rPr lang="en-US" sz="1100">
-                <a:solidFill>
-                  <a:schemeClr val="dk1"/>
-                </a:solidFill>
-              </a:rPr>
-              <a:t>5V</a:t>
-            </a:r>
-            <a:r>
-              <a:rPr lang="en-US" sz="1100">
-                <a:solidFill>
-                  <a:schemeClr val="dk1"/>
-                </a:solidFill>
-              </a:rPr>
-              <a:t> </a:t>
+              <a:t>PWR</a:t>
             </a:r>
             <a:endParaRPr sz="1100">
               <a:solidFill>
@@ -21860,14 +21912,14 @@
       </p:sp>
       <p:sp>
         <p:nvSpPr>
-          <p:cNvPr id="454" name="Google Shape;454;p16"/>
+          <p:cNvPr id="459" name="Google Shape;459;p16"/>
           <p:cNvSpPr txBox="1"/>
           <p:nvPr/>
         </p:nvSpPr>
         <p:spPr>
           <a:xfrm>
-            <a:off x="6194675" y="2912425"/>
-            <a:ext cx="747600" cy="499800"/>
+            <a:off x="4247750" y="2310700"/>
+            <a:ext cx="993300" cy="462600"/>
           </a:xfrm>
           <a:prstGeom prst="rect">
             <a:avLst/>
@@ -21893,19 +21945,221 @@
               <a:buNone/>
             </a:pPr>
             <a:r>
-              <a:rPr lang="en-US" sz="1300">
+              <a:rPr lang="en-US" sz="1100">
                 <a:solidFill>
                   <a:schemeClr val="dk1"/>
                 </a:solidFill>
               </a:rPr>
-              <a:t>P2_13</a:t>
+              <a:t>IO</a:t>
             </a:r>
-            <a:endParaRPr sz="1300">
+            <a:endParaRPr sz="1100">
               <a:solidFill>
                 <a:schemeClr val="dk1"/>
               </a:solidFill>
             </a:endParaRPr>
           </a:p>
+        </p:txBody>
+      </p:sp>
+      <p:cxnSp>
+        <p:nvCxnSpPr>
+          <p:cNvPr id="460" name="Google Shape;460;p16"/>
+          <p:cNvCxnSpPr/>
+          <p:nvPr/>
+        </p:nvCxnSpPr>
+        <p:spPr>
+          <a:xfrm flipH="1" rot="10800000">
+            <a:off x="4083100" y="1963150"/>
+            <a:ext cx="790200" cy="1800"/>
+          </a:xfrm>
+          <a:prstGeom prst="straightConnector1">
+            <a:avLst/>
+          </a:prstGeom>
+          <a:noFill/>
+          <a:ln cap="flat" cmpd="sng" w="9525">
+            <a:solidFill>
+              <a:schemeClr val="dk2"/>
+            </a:solidFill>
+            <a:prstDash val="solid"/>
+            <a:round/>
+            <a:headEnd len="med" w="med" type="none"/>
+            <a:tailEnd len="med" w="med" type="none"/>
+          </a:ln>
+        </p:spPr>
+      </p:cxnSp>
+      <p:cxnSp>
+        <p:nvCxnSpPr>
+          <p:cNvPr id="461" name="Google Shape;461;p16"/>
+          <p:cNvCxnSpPr/>
+          <p:nvPr/>
+        </p:nvCxnSpPr>
+        <p:spPr>
+          <a:xfrm flipH="1" rot="10800000">
+            <a:off x="4439175" y="2831200"/>
+            <a:ext cx="425400" cy="3000"/>
+          </a:xfrm>
+          <a:prstGeom prst="straightConnector1">
+            <a:avLst/>
+          </a:prstGeom>
+          <a:noFill/>
+          <a:ln cap="flat" cmpd="sng" w="9525">
+            <a:solidFill>
+              <a:schemeClr val="dk2"/>
+            </a:solidFill>
+            <a:prstDash val="solid"/>
+            <a:round/>
+            <a:headEnd len="med" w="med" type="none"/>
+            <a:tailEnd len="med" w="med" type="none"/>
+          </a:ln>
+        </p:spPr>
+      </p:cxnSp>
+      <p:cxnSp>
+        <p:nvCxnSpPr>
+          <p:cNvPr id="462" name="Google Shape;462;p16"/>
+          <p:cNvCxnSpPr/>
+          <p:nvPr/>
+        </p:nvCxnSpPr>
+        <p:spPr>
+          <a:xfrm flipH="1" rot="10800000">
+            <a:off x="4867350" y="1963200"/>
+            <a:ext cx="3000" cy="873900"/>
+          </a:xfrm>
+          <a:prstGeom prst="straightConnector1">
+            <a:avLst/>
+          </a:prstGeom>
+          <a:noFill/>
+          <a:ln cap="flat" cmpd="sng" w="9525">
+            <a:solidFill>
+              <a:schemeClr val="dk2"/>
+            </a:solidFill>
+            <a:prstDash val="solid"/>
+            <a:round/>
+            <a:headEnd len="med" w="med" type="none"/>
+            <a:tailEnd len="med" w="med" type="none"/>
+          </a:ln>
+        </p:spPr>
+      </p:cxnSp>
+      <p:sp>
+        <p:nvSpPr>
+          <p:cNvPr id="463" name="Google Shape;463;p16"/>
+          <p:cNvSpPr/>
+          <p:nvPr/>
+        </p:nvSpPr>
+        <p:spPr>
+          <a:xfrm>
+            <a:off x="4418300" y="2813225"/>
+            <a:ext cx="26700" cy="36600"/>
+          </a:xfrm>
+          <a:prstGeom prst="ellipse">
+            <a:avLst/>
+          </a:prstGeom>
+          <a:solidFill>
+            <a:schemeClr val="dk1"/>
+          </a:solidFill>
+          <a:ln cap="flat" cmpd="sng" w="9525">
+            <a:solidFill>
+              <a:schemeClr val="dk2"/>
+            </a:solidFill>
+            <a:prstDash val="solid"/>
+            <a:round/>
+            <a:headEnd len="sm" w="sm" type="none"/>
+            <a:tailEnd len="sm" w="sm" type="none"/>
+          </a:ln>
+        </p:spPr>
+        <p:txBody>
+          <a:bodyPr anchorCtr="0" anchor="ctr" bIns="91425" lIns="91425" spcFirstLastPara="1" rIns="91425" wrap="square" tIns="91425">
+            <a:noAutofit/>
+          </a:bodyPr>
+          <a:lstStyle/>
+          <a:p>
+            <a:pPr indent="0" lvl="0" marL="0" rtl="0" algn="ctr">
+              <a:spcBef>
+                <a:spcPts val="0"/>
+              </a:spcBef>
+              <a:spcAft>
+                <a:spcPts val="0"/>
+              </a:spcAft>
+              <a:buNone/>
+            </a:pPr>
+            <a:r>
+              <a:t/>
+            </a:r>
+            <a:endParaRPr/>
+          </a:p>
+        </p:txBody>
+      </p:sp>
+      <p:sp>
+        <p:nvSpPr>
+          <p:cNvPr id="464" name="Google Shape;464;p16"/>
+          <p:cNvSpPr/>
+          <p:nvPr/>
+        </p:nvSpPr>
+        <p:spPr>
+          <a:xfrm>
+            <a:off x="4391600" y="4827625"/>
+            <a:ext cx="26700" cy="36600"/>
+          </a:xfrm>
+          <a:prstGeom prst="ellipse">
+            <a:avLst/>
+          </a:prstGeom>
+          <a:solidFill>
+            <a:schemeClr val="dk1"/>
+          </a:solidFill>
+          <a:ln cap="flat" cmpd="sng" w="9525">
+            <a:solidFill>
+              <a:schemeClr val="dk2"/>
+            </a:solidFill>
+            <a:prstDash val="solid"/>
+            <a:round/>
+            <a:headEnd len="sm" w="sm" type="none"/>
+            <a:tailEnd len="sm" w="sm" type="none"/>
+          </a:ln>
+        </p:spPr>
+        <p:txBody>
+          <a:bodyPr anchorCtr="0" anchor="ctr" bIns="91425" lIns="91425" spcFirstLastPara="1" rIns="91425" wrap="square" tIns="91425">
+            <a:noAutofit/>
+          </a:bodyPr>
+          <a:lstStyle/>
+          <a:p>
+            <a:pPr indent="0" lvl="0" marL="0" rtl="0" algn="ctr">
+              <a:spcBef>
+                <a:spcPts val="0"/>
+              </a:spcBef>
+              <a:spcAft>
+                <a:spcPts val="0"/>
+              </a:spcAft>
+              <a:buNone/>
+            </a:pPr>
+            <a:r>
+              <a:t/>
+            </a:r>
+            <a:endParaRPr/>
+          </a:p>
+        </p:txBody>
+      </p:sp>
+      <p:sp>
+        <p:nvSpPr>
+          <p:cNvPr id="465" name="Google Shape;465;p16"/>
+          <p:cNvSpPr txBox="1"/>
+          <p:nvPr/>
+        </p:nvSpPr>
+        <p:spPr>
+          <a:xfrm>
+            <a:off x="4205700" y="1725413"/>
+            <a:ext cx="993300" cy="462600"/>
+          </a:xfrm>
+          <a:prstGeom prst="rect">
+            <a:avLst/>
+          </a:prstGeom>
+          <a:noFill/>
+          <a:ln>
+            <a:noFill/>
+          </a:ln>
+        </p:spPr>
+        <p:txBody>
+          <a:bodyPr anchorCtr="0" anchor="t" bIns="91425" lIns="91425" spcFirstLastPara="1" rIns="91425" wrap="square" tIns="91425">
+            <a:noAutofit/>
+          </a:bodyPr>
+          <a:lstStyle/>
           <a:p>
             <a:pPr indent="0" lvl="0" marL="0" rtl="0" algn="l">
               <a:spcBef>
@@ -21917,14 +22171,64 @@
               <a:buNone/>
             </a:pPr>
             <a:r>
-              <a:rPr lang="en-US" sz="1300">
+              <a:rPr lang="en-US" sz="1100">
                 <a:solidFill>
                   <a:schemeClr val="dk1"/>
                 </a:solidFill>
               </a:rPr>
-              <a:t>VOUT</a:t>
+              <a:t>IO</a:t>
             </a:r>
-            <a:endParaRPr sz="1300">
+            <a:endParaRPr sz="1100">
+              <a:solidFill>
+                <a:schemeClr val="dk1"/>
+              </a:solidFill>
+            </a:endParaRPr>
+          </a:p>
+        </p:txBody>
+      </p:sp>
+      <p:sp>
+        <p:nvSpPr>
+          <p:cNvPr id="466" name="Google Shape;466;p16"/>
+          <p:cNvSpPr txBox="1"/>
+          <p:nvPr/>
+        </p:nvSpPr>
+        <p:spPr>
+          <a:xfrm>
+            <a:off x="4132250" y="1395925"/>
+            <a:ext cx="993300" cy="462600"/>
+          </a:xfrm>
+          <a:prstGeom prst="rect">
+            <a:avLst/>
+          </a:prstGeom>
+          <a:noFill/>
+          <a:ln>
+            <a:noFill/>
+          </a:ln>
+        </p:spPr>
+        <p:txBody>
+          <a:bodyPr anchorCtr="0" anchor="t" bIns="91425" lIns="91425" spcFirstLastPara="1" rIns="91425" wrap="square" tIns="91425">
+            <a:noAutofit/>
+          </a:bodyPr>
+          <a:lstStyle/>
+          <a:p>
+            <a:pPr indent="0" lvl="0" marL="0" rtl="0" algn="l">
+              <a:spcBef>
+                <a:spcPts val="0"/>
+              </a:spcBef>
+              <a:spcAft>
+                <a:spcPts val="0"/>
+              </a:spcAft>
+              <a:buNone/>
+            </a:pPr>
+            <a:r>
+              <a:rPr lang="en-US" sz="1100">
+                <a:solidFill>
+                  <a:schemeClr val="dk1"/>
+                </a:solidFill>
+              </a:rPr>
+              <a:t>PWR</a:t>
+            </a:r>
+            <a:endParaRPr sz="1100">
               <a:solidFill>
                 <a:schemeClr val="dk1"/>
               </a:solidFill>
@@ -21957,7 +22261,7 @@
   <p:cSld>
     <p:spTree>
       <p:nvGrpSpPr>
-        <p:cNvPr id="458" name="Shape 458"/>
+        <p:cNvPr id="470" name="Shape 470"/>
         <p:cNvGrpSpPr/>
         <p:nvPr/>
       </p:nvGrpSpPr>
@@ -21971,7 +22275,7 @@
       </p:grpSpPr>
       <p:sp>
         <p:nvSpPr>
-          <p:cNvPr id="459" name="Google Shape;459;p17"/>
+          <p:cNvPr id="471" name="Google Shape;471;p17"/>
           <p:cNvSpPr txBox="1"/>
           <p:nvPr>
             <p:ph type="title"/>
@@ -22023,7 +22327,7 @@
       </p:sp>
       <p:graphicFrame>
         <p:nvGraphicFramePr>
-          <p:cNvPr id="460" name="Google Shape;460;p17"/>
+          <p:cNvPr id="472" name="Google Shape;472;p17"/>
           <p:cNvGraphicFramePr/>
           <p:nvPr/>
         </p:nvGraphicFramePr>
@@ -22036,7 +22340,7 @@
             <a:tbl>
               <a:tblPr bandRow="1" firstRow="1">
                 <a:noFill/>
-                <a:tableStyleId>{C0811D07-2236-452C-81DA-01687698C0FB}</a:tableStyleId>
+                <a:tableStyleId>{BBBCC97F-5A71-45CB-B276-72A98CFE81FD}</a:tableStyleId>
               </a:tblPr>
               <a:tblGrid>
                 <a:gridCol w="7837725"/>
@@ -22154,6 +22458,10 @@
                         </a:rPr>
                         <a:t>Continuous Rotation Motors</a:t>
                       </a:r>
+                      <a:r>
+                        <a:rPr lang="en-US" sz="1800"/>
+                        <a:t> </a:t>
+                      </a:r>
                       <a:endParaRPr sz="1800"/>
                     </a:p>
                   </a:txBody>
@@ -22234,6 +22542,10 @@
                           <a:hlinkClick r:id="rId4"/>
                         </a:rPr>
                         <a:t>L298N Motor Driver</a:t>
+                      </a:r>
+                      <a:r>
+                        <a:rPr lang="en-US" sz="1800"/>
+                        <a:t> </a:t>
                       </a:r>
                       <a:endParaRPr sz="1800"/>
                     </a:p>
@@ -22459,13 +22771,8 @@
                         <a:buNone/>
                       </a:pPr>
                       <a:r>
-                        <a:rPr lang="en-US" sz="1800" u="sng">
-                          <a:solidFill>
-                            <a:schemeClr val="hlink"/>
-                          </a:solidFill>
-                          <a:hlinkClick r:id="rId7"/>
-                        </a:rPr>
-                        <a:t>Logic Shifters</a:t>
+                        <a:rPr lang="en-US" sz="1800"/>
+                        <a:t>Buzzer</a:t>
                       </a:r>
                       <a:endParaRPr sz="1800"/>
                     </a:p>
@@ -22511,7 +22818,7 @@
                       </a:pPr>
                       <a:r>
                         <a:rPr lang="en-US" sz="1800"/>
-                        <a:t>$7.99</a:t>
+                        <a:t>N/A</a:t>
                       </a:r>
                       <a:endParaRPr sz="1800"/>
                     </a:p>
@@ -22536,6 +22843,305 @@
                           <a:schemeClr val="dk1"/>
                         </a:buClr>
                         <a:buFont typeface="Arial"/>
+                        <a:buNone/>
+                      </a:pPr>
+                      <a:r>
+                        <a:rPr lang="en-US" sz="1800" u="sng">
+                          <a:solidFill>
+                            <a:schemeClr val="hlink"/>
+                          </a:solidFill>
+                          <a:hlinkClick r:id="rId7"/>
+                        </a:rPr>
+                        <a:t>DC Motors</a:t>
+                      </a:r>
+                      <a:endParaRPr sz="1800"/>
+                    </a:p>
+                  </a:txBody>
+                  <a:tcPr marT="45725" marB="45725" marR="91450" marL="91450"/>
+                </a:tc>
+                <a:tc>
+                  <a:txBody>
+                    <a:bodyPr/>
+                    <a:lstStyle/>
+                    <a:p>
+                      <a:pPr indent="0" lvl="0" marL="0" marR="0" rtl="0" algn="l">
+                        <a:spcBef>
+                          <a:spcPts val="0"/>
+                        </a:spcBef>
+                        <a:spcAft>
+                          <a:spcPts val="0"/>
+                        </a:spcAft>
+                        <a:buNone/>
+                      </a:pPr>
+                      <a:r>
+                        <a:rPr lang="en-US" sz="1800"/>
+                        <a:t>No</a:t>
+                      </a:r>
+                      <a:endParaRPr sz="1800"/>
+                    </a:p>
+                  </a:txBody>
+                  <a:tcPr marT="45725" marB="45725" marR="91450" marL="91450"/>
+                </a:tc>
+                <a:tc>
+                  <a:txBody>
+                    <a:bodyPr/>
+                    <a:lstStyle/>
+                    <a:p>
+                      <a:pPr indent="0" lvl="0" marL="0" marR="0" rtl="0" algn="l">
+                        <a:spcBef>
+                          <a:spcPts val="0"/>
+                        </a:spcBef>
+                        <a:spcAft>
+                          <a:spcPts val="0"/>
+                        </a:spcAft>
+                        <a:buNone/>
+                      </a:pPr>
+                      <a:r>
+                        <a:rPr lang="en-US" sz="1800"/>
+                        <a:t>$11.99</a:t>
+                      </a:r>
+                      <a:endParaRPr sz="1800"/>
+                    </a:p>
+                  </a:txBody>
+                  <a:tcPr marT="45725" marB="45725" marR="91450" marL="91450"/>
+                </a:tc>
+              </a:tr>
+              <a:tr h="370850">
+                <a:tc>
+                  <a:txBody>
+                    <a:bodyPr/>
+                    <a:lstStyle/>
+                    <a:p>
+                      <a:pPr indent="0" lvl="0" marL="0" rtl="0" algn="l">
+                        <a:spcBef>
+                          <a:spcPts val="0"/>
+                        </a:spcBef>
+                        <a:spcAft>
+                          <a:spcPts val="0"/>
+                        </a:spcAft>
+                        <a:buNone/>
+                      </a:pPr>
+                      <a:r>
+                        <a:rPr lang="en-US" sz="1800" u="sng">
+                          <a:solidFill>
+                            <a:schemeClr val="hlink"/>
+                          </a:solidFill>
+                          <a:hlinkClick r:id="rId8"/>
+                        </a:rPr>
+                        <a:t>Rigid Clear Acrylic Pipe</a:t>
+                      </a:r>
+                      <a:endParaRPr sz="1800"/>
+                    </a:p>
+                  </a:txBody>
+                  <a:tcPr marT="45725" marB="45725" marR="91450" marL="91450"/>
+                </a:tc>
+                <a:tc>
+                  <a:txBody>
+                    <a:bodyPr/>
+                    <a:lstStyle/>
+                    <a:p>
+                      <a:pPr indent="0" lvl="0" marL="0" marR="0" rtl="0" algn="l">
+                        <a:spcBef>
+                          <a:spcPts val="0"/>
+                        </a:spcBef>
+                        <a:spcAft>
+                          <a:spcPts val="0"/>
+                        </a:spcAft>
+                        <a:buNone/>
+                      </a:pPr>
+                      <a:r>
+                        <a:rPr lang="en-US" sz="1800"/>
+                        <a:t>No</a:t>
+                      </a:r>
+                      <a:endParaRPr sz="1800"/>
+                    </a:p>
+                  </a:txBody>
+                  <a:tcPr marT="45725" marB="45725" marR="91450" marL="91450"/>
+                </a:tc>
+                <a:tc>
+                  <a:txBody>
+                    <a:bodyPr/>
+                    <a:lstStyle/>
+                    <a:p>
+                      <a:pPr indent="0" lvl="0" marL="0" marR="0" rtl="0" algn="l">
+                        <a:spcBef>
+                          <a:spcPts val="0"/>
+                        </a:spcBef>
+                        <a:spcAft>
+                          <a:spcPts val="0"/>
+                        </a:spcAft>
+                        <a:buNone/>
+                      </a:pPr>
+                      <a:r>
+                        <a:rPr lang="en-US" sz="1800"/>
+                        <a:t>$14.14</a:t>
+                      </a:r>
+                      <a:endParaRPr sz="1800"/>
+                    </a:p>
+                  </a:txBody>
+                  <a:tcPr marT="45725" marB="45725" marR="91450" marL="91450"/>
+                </a:tc>
+              </a:tr>
+              <a:tr h="370850">
+                <a:tc>
+                  <a:txBody>
+                    <a:bodyPr/>
+                    <a:lstStyle/>
+                    <a:p>
+                      <a:pPr indent="0" lvl="0" marL="0" rtl="0" algn="l">
+                        <a:spcBef>
+                          <a:spcPts val="0"/>
+                        </a:spcBef>
+                        <a:spcAft>
+                          <a:spcPts val="0"/>
+                        </a:spcAft>
+                        <a:buNone/>
+                      </a:pPr>
+                      <a:r>
+                        <a:rPr lang="en-US" sz="1800" u="sng">
+                          <a:solidFill>
+                            <a:schemeClr val="hlink"/>
+                          </a:solidFill>
+                          <a:hlinkClick r:id="rId9"/>
+                        </a:rPr>
+                        <a:t>IR Sensor</a:t>
+                      </a:r>
+                      <a:endParaRPr sz="1800"/>
+                    </a:p>
+                  </a:txBody>
+                  <a:tcPr marT="45725" marB="45725" marR="91450" marL="91450"/>
+                </a:tc>
+                <a:tc>
+                  <a:txBody>
+                    <a:bodyPr/>
+                    <a:lstStyle/>
+                    <a:p>
+                      <a:pPr indent="0" lvl="0" marL="0" marR="0" rtl="0" algn="l">
+                        <a:spcBef>
+                          <a:spcPts val="0"/>
+                        </a:spcBef>
+                        <a:spcAft>
+                          <a:spcPts val="0"/>
+                        </a:spcAft>
+                        <a:buNone/>
+                      </a:pPr>
+                      <a:r>
+                        <a:rPr lang="en-US" sz="1800"/>
+                        <a:t>No</a:t>
+                      </a:r>
+                      <a:endParaRPr sz="1800"/>
+                    </a:p>
+                  </a:txBody>
+                  <a:tcPr marT="45725" marB="45725" marR="91450" marL="91450"/>
+                </a:tc>
+                <a:tc>
+                  <a:txBody>
+                    <a:bodyPr/>
+                    <a:lstStyle/>
+                    <a:p>
+                      <a:pPr indent="0" lvl="0" marL="0" marR="0" rtl="0" algn="l">
+                        <a:spcBef>
+                          <a:spcPts val="0"/>
+                        </a:spcBef>
+                        <a:spcAft>
+                          <a:spcPts val="0"/>
+                        </a:spcAft>
+                        <a:buNone/>
+                      </a:pPr>
+                      <a:r>
+                        <a:rPr lang="en-US" sz="1800"/>
+                        <a:t>$9.99</a:t>
+                      </a:r>
+                      <a:endParaRPr sz="1800"/>
+                    </a:p>
+                  </a:txBody>
+                  <a:tcPr marT="45725" marB="45725" marR="91450" marL="91450"/>
+                </a:tc>
+              </a:tr>
+              <a:tr h="370850">
+                <a:tc>
+                  <a:txBody>
+                    <a:bodyPr/>
+                    <a:lstStyle/>
+                    <a:p>
+                      <a:pPr indent="0" lvl="0" marL="0" rtl="0" algn="l">
+                        <a:spcBef>
+                          <a:spcPts val="0"/>
+                        </a:spcBef>
+                        <a:spcAft>
+                          <a:spcPts val="0"/>
+                        </a:spcAft>
+                        <a:buNone/>
+                      </a:pPr>
+                      <a:r>
+                        <a:rPr lang="en-US" sz="1800"/>
+                        <a:t>Yellow and Blue LEDS</a:t>
+                      </a:r>
+                      <a:endParaRPr sz="1800"/>
+                    </a:p>
+                  </a:txBody>
+                  <a:tcPr marT="45725" marB="45725" marR="91450" marL="91450"/>
+                </a:tc>
+                <a:tc>
+                  <a:txBody>
+                    <a:bodyPr/>
+                    <a:lstStyle/>
+                    <a:p>
+                      <a:pPr indent="0" lvl="0" marL="0" marR="0" rtl="0" algn="l">
+                        <a:spcBef>
+                          <a:spcPts val="0"/>
+                        </a:spcBef>
+                        <a:spcAft>
+                          <a:spcPts val="0"/>
+                        </a:spcAft>
+                        <a:buNone/>
+                      </a:pPr>
+                      <a:r>
+                        <a:rPr lang="en-US" sz="1800"/>
+                        <a:t>No</a:t>
+                      </a:r>
+                      <a:endParaRPr sz="1800"/>
+                    </a:p>
+                  </a:txBody>
+                  <a:tcPr marT="45725" marB="45725" marR="91450" marL="91450"/>
+                </a:tc>
+                <a:tc>
+                  <a:txBody>
+                    <a:bodyPr/>
+                    <a:lstStyle/>
+                    <a:p>
+                      <a:pPr indent="0" lvl="0" marL="0" marR="0" rtl="0" algn="l">
+                        <a:spcBef>
+                          <a:spcPts val="0"/>
+                        </a:spcBef>
+                        <a:spcAft>
+                          <a:spcPts val="0"/>
+                        </a:spcAft>
+                        <a:buNone/>
+                      </a:pPr>
+                      <a:r>
+                        <a:rPr lang="en-US" sz="1800"/>
+                        <a:t>N/A</a:t>
+                      </a:r>
+                      <a:endParaRPr sz="1800"/>
+                    </a:p>
+                  </a:txBody>
+                  <a:tcPr marT="45725" marB="45725" marR="91450" marL="91450"/>
+                </a:tc>
+              </a:tr>
+              <a:tr h="370850">
+                <a:tc>
+                  <a:txBody>
+                    <a:bodyPr/>
+                    <a:lstStyle/>
+                    <a:p>
+                      <a:pPr indent="0" lvl="0" marL="0" rtl="0" algn="l">
+                        <a:spcBef>
+                          <a:spcPts val="0"/>
+                        </a:spcBef>
+                        <a:spcAft>
+                          <a:spcPts val="0"/>
+                        </a:spcAft>
                         <a:buNone/>
                       </a:pPr>
                       <a:r>
@@ -22616,6 +23222,285 @@
 </file>
 
 <file path=ppt/theme/theme1.xml><?xml version="1.0" encoding="utf-8"?>
+<a:theme xmlns:a="http://schemas.openxmlformats.org/drawingml/2006/main" xmlns:r="http://schemas.openxmlformats.org/officeDocument/2006/relationships" name="Office Theme">
+  <a:themeElements>
+    <a:clrScheme name="DiamondGrid">
+      <a:dk1>
+        <a:srgbClr val="2D2E2D"/>
+      </a:dk1>
+      <a:lt1>
+        <a:srgbClr val="FFFFFF"/>
+      </a:lt1>
+      <a:dk2>
+        <a:srgbClr val="000000"/>
+      </a:dk2>
+      <a:lt2>
+        <a:srgbClr val="EAEAEA"/>
+      </a:lt2>
+      <a:accent1>
+        <a:srgbClr val="D15A3E"/>
+      </a:accent1>
+      <a:accent2>
+        <a:srgbClr val="B2B2B2"/>
+      </a:accent2>
+      <a:accent3>
+        <a:srgbClr val="4F91A1"/>
+      </a:accent3>
+      <a:accent4>
+        <a:srgbClr val="F0BA34"/>
+      </a:accent4>
+      <a:accent5>
+        <a:srgbClr val="AEB733"/>
+      </a:accent5>
+      <a:accent6>
+        <a:srgbClr val="926397"/>
+      </a:accent6>
+      <a:hlink>
+        <a:srgbClr val="4F91A1"/>
+      </a:hlink>
+      <a:folHlink>
+        <a:srgbClr val="808080"/>
+      </a:folHlink>
+    </a:clrScheme>
+    <a:fontScheme name="Office">
+      <a:majorFont>
+        <a:latin typeface="Arial"/>
+        <a:ea typeface=""/>
+        <a:cs typeface=""/>
+        <a:font script="Jpan" typeface="ＭＳ Ｐゴシック"/>
+        <a:font script="Hang" typeface="맑은 고딕"/>
+        <a:font script="Hans" typeface="宋体"/>
+        <a:font script="Hant" typeface="新細明體"/>
+        <a:font script="Arab" typeface="Times New Roman"/>
+        <a:font script="Hebr" typeface="Times New Roman"/>
+        <a:font script="Thai" typeface="Angsana New"/>
+        <a:font script="Ethi" typeface="Nyala"/>
+        <a:font script="Beng" typeface="Vrinda"/>
+        <a:font script="Gujr" typeface="Shruti"/>
+        <a:font script="Khmr" typeface="MoolBoran"/>
+        <a:font script="Knda" typeface="Tunga"/>
+        <a:font script="Guru" typeface="Raavi"/>
+        <a:font script="Cans" typeface="Euphemia"/>
+        <a:font script="Cher" typeface="Plantagenet Cherokee"/>
+        <a:font script="Yiii" typeface="Microsoft Yi Baiti"/>
+        <a:font script="Tibt" typeface="Microsoft Himalaya"/>
+        <a:font script="Thaa" typeface="MV Boli"/>
+        <a:font script="Deva" typeface="Mangal"/>
+        <a:font script="Telu" typeface="Gautami"/>
+        <a:font script="Taml" typeface="Latha"/>
+        <a:font script="Syrc" typeface="Estrangelo Edessa"/>
+        <a:font script="Orya" typeface="Kalinga"/>
+        <a:font script="Mlym" typeface="Kartika"/>
+        <a:font script="Laoo" typeface="DokChampa"/>
+        <a:font script="Sinh" typeface="Iskoola Pota"/>
+        <a:font script="Mong" typeface="Mongolian Baiti"/>
+        <a:font script="Viet" typeface="Times New Roman"/>
+        <a:font script="Uigh" typeface="Microsoft Uighur"/>
+        <a:font script="Geor" typeface="Sylfaen"/>
+      </a:majorFont>
+      <a:minorFont>
+        <a:latin typeface="Arial"/>
+        <a:ea typeface=""/>
+        <a:cs typeface=""/>
+        <a:font script="Jpan" typeface="ＭＳ Ｐゴシック"/>
+        <a:font script="Hang" typeface="맑은 고딕"/>
+        <a:font script="Hans" typeface="宋体"/>
+        <a:font script="Hant" typeface="新細明體"/>
+        <a:font script="Arab" typeface="Arial"/>
+        <a:font script="Hebr" typeface="Arial"/>
+        <a:font script="Thai" typeface="Cordia New"/>
+        <a:font script="Ethi" typeface="Nyala"/>
+        <a:font script="Beng" typeface="Vrinda"/>
+        <a:font script="Gujr" typeface="Shruti"/>
+        <a:font script="Khmr" typeface="DaunPenh"/>
+        <a:font script="Knda" typeface="Tunga"/>
+        <a:font script="Guru" typeface="Raavi"/>
+        <a:font script="Cans" typeface="Euphemia"/>
+        <a:font script="Cher" typeface="Plantagenet Cherokee"/>
+        <a:font script="Yiii" typeface="Microsoft Yi Baiti"/>
+        <a:font script="Tibt" typeface="Microsoft Himalaya"/>
+        <a:font script="Thaa" typeface="MV Boli"/>
+        <a:font script="Deva" typeface="Mangal"/>
+        <a:font script="Telu" typeface="Gautami"/>
+        <a:font script="Taml" typeface="Latha"/>
+        <a:font script="Syrc" typeface="Estrangelo Edessa"/>
+        <a:font script="Orya" typeface="Kalinga"/>
+        <a:font script="Mlym" typeface="Kartika"/>
+        <a:font script="Laoo" typeface="DokChampa"/>
+        <a:font script="Sinh" typeface="Iskoola Pota"/>
+        <a:font script="Mong" typeface="Mongolian Baiti"/>
+        <a:font script="Viet" typeface="Arial"/>
+        <a:font script="Uigh" typeface="Microsoft Uighur"/>
+        <a:font script="Geor" typeface="Sylfaen"/>
+      </a:minorFont>
+    </a:fontScheme>
+    <a:fmtScheme name="Office">
+      <a:fillStyleLst>
+        <a:solidFill>
+          <a:schemeClr val="phClr"/>
+        </a:solidFill>
+        <a:gradFill rotWithShape="1">
+          <a:gsLst>
+            <a:gs pos="0">
+              <a:schemeClr val="phClr">
+                <a:tint val="50000"/>
+                <a:satMod val="300000"/>
+              </a:schemeClr>
+            </a:gs>
+            <a:gs pos="35000">
+              <a:schemeClr val="phClr">
+                <a:tint val="37000"/>
+                <a:satMod val="300000"/>
+              </a:schemeClr>
+            </a:gs>
+            <a:gs pos="100000">
+              <a:schemeClr val="phClr">
+                <a:tint val="15000"/>
+                <a:satMod val="350000"/>
+              </a:schemeClr>
+            </a:gs>
+          </a:gsLst>
+          <a:lin ang="16200000" scaled="1"/>
+        </a:gradFill>
+        <a:gradFill rotWithShape="1">
+          <a:gsLst>
+            <a:gs pos="0">
+              <a:schemeClr val="phClr">
+                <a:tint val="100000"/>
+                <a:shade val="100000"/>
+                <a:satMod val="130000"/>
+              </a:schemeClr>
+            </a:gs>
+            <a:gs pos="100000">
+              <a:schemeClr val="phClr">
+                <a:tint val="50000"/>
+                <a:shade val="100000"/>
+                <a:satMod val="350000"/>
+              </a:schemeClr>
+            </a:gs>
+          </a:gsLst>
+          <a:lin ang="16200000" scaled="0"/>
+        </a:gradFill>
+      </a:fillStyleLst>
+      <a:lnStyleLst>
+        <a:ln w="9525" cap="flat" cmpd="sng" algn="ctr">
+          <a:solidFill>
+            <a:schemeClr val="phClr">
+              <a:shade val="95000"/>
+              <a:satMod val="105000"/>
+            </a:schemeClr>
+          </a:solidFill>
+          <a:prstDash val="solid"/>
+        </a:ln>
+        <a:ln w="25400" cap="flat" cmpd="sng" algn="ctr">
+          <a:solidFill>
+            <a:schemeClr val="phClr"/>
+          </a:solidFill>
+          <a:prstDash val="solid"/>
+        </a:ln>
+        <a:ln w="38100" cap="flat" cmpd="sng" algn="ctr">
+          <a:solidFill>
+            <a:schemeClr val="phClr"/>
+          </a:solidFill>
+          <a:prstDash val="solid"/>
+        </a:ln>
+      </a:lnStyleLst>
+      <a:effectStyleLst>
+        <a:effectStyle>
+          <a:effectLst>
+            <a:outerShdw blurRad="40000" dist="20000" dir="5400000" rotWithShape="0">
+              <a:srgbClr val="000000">
+                <a:alpha val="38000"/>
+              </a:srgbClr>
+            </a:outerShdw>
+          </a:effectLst>
+        </a:effectStyle>
+        <a:effectStyle>
+          <a:effectLst>
+            <a:outerShdw blurRad="40000" dist="23000" dir="5400000" rotWithShape="0">
+              <a:srgbClr val="000000">
+                <a:alpha val="35000"/>
+              </a:srgbClr>
+            </a:outerShdw>
+          </a:effectLst>
+        </a:effectStyle>
+        <a:effectStyle>
+          <a:effectLst>
+            <a:outerShdw blurRad="40000" dist="23000" dir="5400000" rotWithShape="0">
+              <a:srgbClr val="000000">
+                <a:alpha val="35000"/>
+              </a:srgbClr>
+            </a:outerShdw>
+          </a:effectLst>
+          <a:scene3d>
+            <a:camera prst="orthographicFront">
+              <a:rot lat="0" lon="0" rev="0"/>
+            </a:camera>
+            <a:lightRig rig="threePt" dir="t">
+              <a:rot lat="0" lon="0" rev="1200000"/>
+            </a:lightRig>
+          </a:scene3d>
+          <a:sp3d>
+            <a:bevelT w="63500" h="25400"/>
+          </a:sp3d>
+        </a:effectStyle>
+      </a:effectStyleLst>
+      <a:bgFillStyleLst>
+        <a:solidFill>
+          <a:schemeClr val="phClr"/>
+        </a:solidFill>
+        <a:gradFill rotWithShape="1">
+          <a:gsLst>
+            <a:gs pos="0">
+              <a:schemeClr val="phClr">
+                <a:tint val="40000"/>
+                <a:satMod val="350000"/>
+              </a:schemeClr>
+            </a:gs>
+            <a:gs pos="40000">
+              <a:schemeClr val="phClr">
+                <a:tint val="45000"/>
+                <a:shade val="99000"/>
+                <a:satMod val="350000"/>
+              </a:schemeClr>
+            </a:gs>
+            <a:gs pos="100000">
+              <a:schemeClr val="phClr">
+                <a:shade val="20000"/>
+                <a:satMod val="255000"/>
+              </a:schemeClr>
+            </a:gs>
+          </a:gsLst>
+          <a:path path="circle">
+            <a:fillToRect l="50000" t="-80000" r="50000" b="180000"/>
+          </a:path>
+        </a:gradFill>
+        <a:gradFill rotWithShape="1">
+          <a:gsLst>
+            <a:gs pos="0">
+              <a:schemeClr val="phClr">
+                <a:tint val="80000"/>
+                <a:satMod val="300000"/>
+              </a:schemeClr>
+            </a:gs>
+            <a:gs pos="100000">
+              <a:schemeClr val="phClr">
+                <a:shade val="30000"/>
+                <a:satMod val="200000"/>
+              </a:schemeClr>
+            </a:gs>
+          </a:gsLst>
+          <a:path path="circle">
+            <a:fillToRect l="50000" t="50000" r="50000" b="50000"/>
+          </a:path>
+        </a:gradFill>
+      </a:bgFillStyleLst>
+    </a:fmtScheme>
+  </a:themeElements>
+</a:theme>
+</file>
+
+<file path=ppt/theme/theme2.xml><?xml version="1.0" encoding="utf-8"?>
 <a:theme xmlns:a="http://schemas.openxmlformats.org/drawingml/2006/main" xmlns:r="http://schemas.openxmlformats.org/officeDocument/2006/relationships" name="Diamond Grid 16x9">
   <a:themeElements>
     <a:clrScheme name="Custom 3">
@@ -22892,283 +23777,4 @@
     </a:fmtScheme>
   </a:themeElements>
 </a:theme>
-</file>
-
-<file path=ppt/theme/theme2.xml><?xml version="1.0" encoding="utf-8"?>
-<a:theme xmlns:a="http://schemas.openxmlformats.org/drawingml/2006/main" xmlns:r="http://schemas.openxmlformats.org/officeDocument/2006/relationships" name="Office Theme">
-  <a:themeElements>
-    <a:clrScheme name="DiamondGrid">
-      <a:dk1>
-        <a:srgbClr val="2D2E2D"/>
-      </a:dk1>
-      <a:lt1>
-        <a:srgbClr val="FFFFFF"/>
-      </a:lt1>
-      <a:dk2>
-        <a:srgbClr val="000000"/>
-      </a:dk2>
-      <a:lt2>
-        <a:srgbClr val="EAEAEA"/>
-      </a:lt2>
-      <a:accent1>
-        <a:srgbClr val="D15A3E"/>
-      </a:accent1>
-      <a:accent2>
-        <a:srgbClr val="B2B2B2"/>
-      </a:accent2>
-      <a:accent3>
-        <a:srgbClr val="4F91A1"/>
-      </a:accent3>
-      <a:accent4>
-        <a:srgbClr val="F0BA34"/>
-      </a:accent4>
-      <a:accent5>
-        <a:srgbClr val="AEB733"/>
-      </a:accent5>
-      <a:accent6>
-        <a:srgbClr val="926397"/>
-      </a:accent6>
-      <a:hlink>
-        <a:srgbClr val="4F91A1"/>
-      </a:hlink>
-      <a:folHlink>
-        <a:srgbClr val="808080"/>
-      </a:folHlink>
-    </a:clrScheme>
-    <a:fontScheme name="Office">
-      <a:majorFont>
-        <a:latin typeface="Arial"/>
-        <a:ea typeface=""/>
-        <a:cs typeface=""/>
-        <a:font script="Jpan" typeface="ＭＳ Ｐゴシック"/>
-        <a:font script="Hang" typeface="맑은 고딕"/>
-        <a:font script="Hans" typeface="宋体"/>
-        <a:font script="Hant" typeface="新細明體"/>
-        <a:font script="Arab" typeface="Times New Roman"/>
-        <a:font script="Hebr" typeface="Times New Roman"/>
-        <a:font script="Thai" typeface="Angsana New"/>
-        <a:font script="Ethi" typeface="Nyala"/>
-        <a:font script="Beng" typeface="Vrinda"/>
-        <a:font script="Gujr" typeface="Shruti"/>
-        <a:font script="Khmr" typeface="MoolBoran"/>
-        <a:font script="Knda" typeface="Tunga"/>
-        <a:font script="Guru" typeface="Raavi"/>
-        <a:font script="Cans" typeface="Euphemia"/>
-        <a:font script="Cher" typeface="Plantagenet Cherokee"/>
-        <a:font script="Yiii" typeface="Microsoft Yi Baiti"/>
-        <a:font script="Tibt" typeface="Microsoft Himalaya"/>
-        <a:font script="Thaa" typeface="MV Boli"/>
-        <a:font script="Deva" typeface="Mangal"/>
-        <a:font script="Telu" typeface="Gautami"/>
-        <a:font script="Taml" typeface="Latha"/>
-        <a:font script="Syrc" typeface="Estrangelo Edessa"/>
-        <a:font script="Orya" typeface="Kalinga"/>
-        <a:font script="Mlym" typeface="Kartika"/>
-        <a:font script="Laoo" typeface="DokChampa"/>
-        <a:font script="Sinh" typeface="Iskoola Pota"/>
-        <a:font script="Mong" typeface="Mongolian Baiti"/>
-        <a:font script="Viet" typeface="Times New Roman"/>
-        <a:font script="Uigh" typeface="Microsoft Uighur"/>
-        <a:font script="Geor" typeface="Sylfaen"/>
-      </a:majorFont>
-      <a:minorFont>
-        <a:latin typeface="Arial"/>
-        <a:ea typeface=""/>
-        <a:cs typeface=""/>
-        <a:font script="Jpan" typeface="ＭＳ Ｐゴシック"/>
-        <a:font script="Hang" typeface="맑은 고딕"/>
-        <a:font script="Hans" typeface="宋体"/>
-        <a:font script="Hant" typeface="新細明體"/>
-        <a:font script="Arab" typeface="Arial"/>
-        <a:font script="Hebr" typeface="Arial"/>
-        <a:font script="Thai" typeface="Cordia New"/>
-        <a:font script="Ethi" typeface="Nyala"/>
-        <a:font script="Beng" typeface="Vrinda"/>
-        <a:font script="Gujr" typeface="Shruti"/>
-        <a:font script="Khmr" typeface="DaunPenh"/>
-        <a:font script="Knda" typeface="Tunga"/>
-        <a:font script="Guru" typeface="Raavi"/>
-        <a:font script="Cans" typeface="Euphemia"/>
-        <a:font script="Cher" typeface="Plantagenet Cherokee"/>
-        <a:font script="Yiii" typeface="Microsoft Yi Baiti"/>
-        <a:font script="Tibt" typeface="Microsoft Himalaya"/>
-        <a:font script="Thaa" typeface="MV Boli"/>
-        <a:font script="Deva" typeface="Mangal"/>
-        <a:font script="Telu" typeface="Gautami"/>
-        <a:font script="Taml" typeface="Latha"/>
-        <a:font script="Syrc" typeface="Estrangelo Edessa"/>
-        <a:font script="Orya" typeface="Kalinga"/>
-        <a:font script="Mlym" typeface="Kartika"/>
-        <a:font script="Laoo" typeface="DokChampa"/>
-        <a:font script="Sinh" typeface="Iskoola Pota"/>
-        <a:font script="Mong" typeface="Mongolian Baiti"/>
-        <a:font script="Viet" typeface="Arial"/>
-        <a:font script="Uigh" typeface="Microsoft Uighur"/>
-        <a:font script="Geor" typeface="Sylfaen"/>
-      </a:minorFont>
-    </a:fontScheme>
-    <a:fmtScheme name="Office">
-      <a:fillStyleLst>
-        <a:solidFill>
-          <a:schemeClr val="phClr"/>
-        </a:solidFill>
-        <a:gradFill rotWithShape="1">
-          <a:gsLst>
-            <a:gs pos="0">
-              <a:schemeClr val="phClr">
-                <a:tint val="50000"/>
-                <a:satMod val="300000"/>
-              </a:schemeClr>
-            </a:gs>
-            <a:gs pos="35000">
-              <a:schemeClr val="phClr">
-                <a:tint val="37000"/>
-                <a:satMod val="300000"/>
-              </a:schemeClr>
-            </a:gs>
-            <a:gs pos="100000">
-              <a:schemeClr val="phClr">
-                <a:tint val="15000"/>
-                <a:satMod val="350000"/>
-              </a:schemeClr>
-            </a:gs>
-          </a:gsLst>
-          <a:lin ang="16200000" scaled="1"/>
-        </a:gradFill>
-        <a:gradFill rotWithShape="1">
-          <a:gsLst>
-            <a:gs pos="0">
-              <a:schemeClr val="phClr">
-                <a:tint val="100000"/>
-                <a:shade val="100000"/>
-                <a:satMod val="130000"/>
-              </a:schemeClr>
-            </a:gs>
-            <a:gs pos="100000">
-              <a:schemeClr val="phClr">
-                <a:tint val="50000"/>
-                <a:shade val="100000"/>
-                <a:satMod val="350000"/>
-              </a:schemeClr>
-            </a:gs>
-          </a:gsLst>
-          <a:lin ang="16200000" scaled="0"/>
-        </a:gradFill>
-      </a:fillStyleLst>
-      <a:lnStyleLst>
-        <a:ln w="9525" cap="flat" cmpd="sng" algn="ctr">
-          <a:solidFill>
-            <a:schemeClr val="phClr">
-              <a:shade val="95000"/>
-              <a:satMod val="105000"/>
-            </a:schemeClr>
-          </a:solidFill>
-          <a:prstDash val="solid"/>
-        </a:ln>
-        <a:ln w="25400" cap="flat" cmpd="sng" algn="ctr">
-          <a:solidFill>
-            <a:schemeClr val="phClr"/>
-          </a:solidFill>
-          <a:prstDash val="solid"/>
-        </a:ln>
-        <a:ln w="38100" cap="flat" cmpd="sng" algn="ctr">
-          <a:solidFill>
-            <a:schemeClr val="phClr"/>
-          </a:solidFill>
-          <a:prstDash val="solid"/>
-        </a:ln>
-      </a:lnStyleLst>
-      <a:effectStyleLst>
-        <a:effectStyle>
-          <a:effectLst>
-            <a:outerShdw blurRad="40000" dist="20000" dir="5400000" rotWithShape="0">
-              <a:srgbClr val="000000">
-                <a:alpha val="38000"/>
-              </a:srgbClr>
-            </a:outerShdw>
-          </a:effectLst>
-        </a:effectStyle>
-        <a:effectStyle>
-          <a:effectLst>
-            <a:outerShdw blurRad="40000" dist="23000" dir="5400000" rotWithShape="0">
-              <a:srgbClr val="000000">
-                <a:alpha val="35000"/>
-              </a:srgbClr>
-            </a:outerShdw>
-          </a:effectLst>
-        </a:effectStyle>
-        <a:effectStyle>
-          <a:effectLst>
-            <a:outerShdw blurRad="40000" dist="23000" dir="5400000" rotWithShape="0">
-              <a:srgbClr val="000000">
-                <a:alpha val="35000"/>
-              </a:srgbClr>
-            </a:outerShdw>
-          </a:effectLst>
-          <a:scene3d>
-            <a:camera prst="orthographicFront">
-              <a:rot lat="0" lon="0" rev="0"/>
-            </a:camera>
-            <a:lightRig rig="threePt" dir="t">
-              <a:rot lat="0" lon="0" rev="1200000"/>
-            </a:lightRig>
-          </a:scene3d>
-          <a:sp3d>
-            <a:bevelT w="63500" h="25400"/>
-          </a:sp3d>
-        </a:effectStyle>
-      </a:effectStyleLst>
-      <a:bgFillStyleLst>
-        <a:solidFill>
-          <a:schemeClr val="phClr"/>
-        </a:solidFill>
-        <a:gradFill rotWithShape="1">
-          <a:gsLst>
-            <a:gs pos="0">
-              <a:schemeClr val="phClr">
-                <a:tint val="40000"/>
-                <a:satMod val="350000"/>
-              </a:schemeClr>
-            </a:gs>
-            <a:gs pos="40000">
-              <a:schemeClr val="phClr">
-                <a:tint val="45000"/>
-                <a:shade val="99000"/>
-                <a:satMod val="350000"/>
-              </a:schemeClr>
-            </a:gs>
-            <a:gs pos="100000">
-              <a:schemeClr val="phClr">
-                <a:shade val="20000"/>
-                <a:satMod val="255000"/>
-              </a:schemeClr>
-            </a:gs>
-          </a:gsLst>
-          <a:path path="circle">
-            <a:fillToRect l="50000" t="-80000" r="50000" b="180000"/>
-          </a:path>
-        </a:gradFill>
-        <a:gradFill rotWithShape="1">
-          <a:gsLst>
-            <a:gs pos="0">
-              <a:schemeClr val="phClr">
-                <a:tint val="80000"/>
-                <a:satMod val="300000"/>
-              </a:schemeClr>
-            </a:gs>
-            <a:gs pos="100000">
-              <a:schemeClr val="phClr">
-                <a:shade val="30000"/>
-                <a:satMod val="200000"/>
-              </a:schemeClr>
-            </a:gs>
-          </a:gsLst>
-          <a:path path="circle">
-            <a:fillToRect l="50000" t="50000" r="50000" b="50000"/>
-          </a:path>
-        </a:gradFill>
-      </a:bgFillStyleLst>
-    </a:fmtScheme>
-  </a:themeElements>
-</a:theme>
 </file>
</xml_diff>